<commit_message>
Prepare v2.0.0 release candidate 0
</commit_message>
<xml_diff>
--- a/Doxygen/images/src/SPI_pin_connection.pptx
+++ b/Doxygen/images/src/SPI_pin_connection.pptx
@@ -256,7 +256,7 @@
             <a:fld id="{E72D30EF-8F20-0B47-8B5D-39A8BC29E860}" type="datetimeFigureOut">
               <a:rPr lang="en-US" smtClean="0"/>
               <a:pPr/>
-              <a:t>5/6/2020</a:t>
+              <a:t>7/6/2020</a:t>
             </a:fld>
             <a:endParaRPr lang="en-US"/>
           </a:p>
@@ -424,7 +424,7 @@
             <a:fld id="{77EDD36E-1E02-F241-9611-1F1D9EAAD326}" type="datetimeFigureOut">
               <a:rPr lang="en-US" smtClean="0"/>
               <a:pPr/>
-              <a:t>5/6/2020</a:t>
+              <a:t>7/6/2020</a:t>
             </a:fld>
             <a:endParaRPr lang="en-US"/>
           </a:p>
@@ -3886,24 +3886,56 @@
       </p:grpSpPr>
       <p:sp>
         <p:nvSpPr>
-          <p:cNvPr id="4" name="Rectangle 3"/>
+          <p:cNvPr id="238" name="Title 237">
+            <a:extLst>
+              <a:ext uri="{FF2B5EF4-FFF2-40B4-BE49-F238E27FC236}">
+                <a16:creationId xmlns:a16="http://schemas.microsoft.com/office/drawing/2014/main" id="{80D63FCD-51E2-4072-B3AA-78FBCF1C481F}"/>
+              </a:ext>
+            </a:extLst>
+          </p:cNvPr>
+          <p:cNvSpPr>
+            <a:spLocks noGrp="1"/>
+          </p:cNvSpPr>
+          <p:nvPr>
+            <p:ph type="title"/>
+          </p:nvPr>
+        </p:nvSpPr>
+        <p:spPr/>
+        <p:txBody>
+          <a:bodyPr>
+            <a:normAutofit fontScale="90000"/>
+          </a:bodyPr>
+          <a:lstStyle/>
+          <a:p>
+            <a:r>
+              <a:rPr lang="en-US" dirty="0"/>
+              <a:t>Test Mode Loopback pin connections</a:t>
+            </a:r>
+          </a:p>
+        </p:txBody>
+      </p:sp>
+      <p:sp>
+        <p:nvSpPr>
+          <p:cNvPr id="14" name="Rounded Rectangle 70">
+            <a:extLst>
+              <a:ext uri="{FF2B5EF4-FFF2-40B4-BE49-F238E27FC236}">
+                <a16:creationId xmlns:a16="http://schemas.microsoft.com/office/drawing/2014/main" id="{7C8ABD2D-D941-432D-945E-CAC7123457E1}"/>
+              </a:ext>
+            </a:extLst>
+          </p:cNvPr>
           <p:cNvSpPr/>
           <p:nvPr/>
         </p:nvSpPr>
         <p:spPr bwMode="auto">
           <a:xfrm>
-            <a:off x="2050474" y="2434068"/>
-            <a:ext cx="3134420" cy="2738007"/>
-          </a:xfrm>
-          <a:prstGeom prst="rect">
+            <a:off x="1029879" y="1868211"/>
+            <a:ext cx="3689267" cy="433388"/>
+          </a:xfrm>
+          <a:prstGeom prst="roundRect">
             <a:avLst/>
           </a:prstGeom>
-          <a:solidFill>
-            <a:schemeClr val="bg1">
-              <a:lumMod val="95000"/>
-            </a:schemeClr>
-          </a:solidFill>
-          <a:ln w="19050">
+          <a:noFill/>
+          <a:ln w="12700">
             <a:noFill/>
           </a:ln>
         </p:spPr>
@@ -3927,107 +3959,54 @@
           <a:bodyPr anchor="ctr"/>
           <a:lstStyle/>
           <a:p>
-            <a:pPr algn="r">
-              <a:defRPr/>
-            </a:pPr>
-            <a:endParaRPr lang="en-GB" dirty="0"/>
-          </a:p>
-        </p:txBody>
-      </p:sp>
-      <p:sp>
-        <p:nvSpPr>
-          <p:cNvPr id="6" name="TextBox 5"/>
-          <p:cNvSpPr txBox="1"/>
-          <p:nvPr/>
-        </p:nvSpPr>
-        <p:spPr bwMode="auto">
-          <a:xfrm>
-            <a:off x="3324226" y="3059886"/>
-            <a:ext cx="1641380" cy="461665"/>
-          </a:xfrm>
-          <a:prstGeom prst="rect">
-            <a:avLst/>
-          </a:prstGeom>
-          <a:solidFill>
-            <a:schemeClr val="bg1">
-              <a:lumMod val="85000"/>
-            </a:schemeClr>
-          </a:solidFill>
-          <a:ln>
-            <a:noFill/>
-          </a:ln>
-        </p:spPr>
-        <p:txBody>
-          <a:bodyPr wrap="square" rIns="144000">
-            <a:spAutoFit/>
-          </a:bodyPr>
-          <a:lstStyle/>
-          <a:p>
             <a:pPr algn="ctr">
               <a:defRPr/>
             </a:pPr>
             <a:r>
-              <a:rPr lang="en-GB" sz="1200" b="1" dirty="0">
-                <a:latin typeface="+mn-lt"/>
+              <a:rPr lang="en-US" sz="1600" b="1">
+                <a:solidFill>
+                  <a:schemeClr val="tx1"/>
+                </a:solidFill>
+                <a:latin typeface="Gill Sans MT" pitchFamily="34" charset="0"/>
+                <a:cs typeface="Courier New" pitchFamily="49" charset="0"/>
               </a:rPr>
-              <a:t>Master Output  Slave Input (MOSI)</a:t>
-            </a:r>
-          </a:p>
-        </p:txBody>
-      </p:sp>
-      <p:sp>
-        <p:nvSpPr>
-          <p:cNvPr id="10" name="TextBox 9"/>
-          <p:cNvSpPr txBox="1"/>
-          <p:nvPr/>
-        </p:nvSpPr>
-        <p:spPr bwMode="auto">
-          <a:xfrm>
-            <a:off x="3320035" y="2674535"/>
-            <a:ext cx="1641380" cy="288000"/>
-          </a:xfrm>
-          <a:prstGeom prst="rect">
-            <a:avLst/>
-          </a:prstGeom>
-          <a:solidFill>
-            <a:schemeClr val="bg1">
-              <a:lumMod val="85000"/>
-            </a:schemeClr>
-          </a:solidFill>
-          <a:ln>
-            <a:noFill/>
-          </a:ln>
-        </p:spPr>
-        <p:txBody>
-          <a:bodyPr wrap="square" rIns="144000">
-            <a:spAutoFit/>
-          </a:bodyPr>
-          <a:lstStyle/>
-          <a:p>
-            <a:pPr algn="ctr">
-              <a:defRPr/>
-            </a:pPr>
-            <a:r>
-              <a:rPr lang="en-US" sz="1200" b="1" dirty="0">
-                <a:latin typeface="+mn-lt"/>
+              <a:t>Device (Driver) </a:t>
+            </a:r>
+            <a:r>
+              <a:rPr lang="en-US" sz="1600" b="1" dirty="0">
+                <a:solidFill>
+                  <a:schemeClr val="tx1"/>
+                </a:solidFill>
+                <a:latin typeface="Gill Sans MT" pitchFamily="34" charset="0"/>
+                <a:cs typeface="Courier New" pitchFamily="49" charset="0"/>
               </a:rPr>
-              <a:t>SPI Clock (SCK)</a:t>
-            </a:r>
-            <a:endParaRPr lang="en-GB" sz="1200" b="1" dirty="0">
-              <a:latin typeface="+mn-lt"/>
+              <a:t>Under Test (DUT)</a:t>
+            </a:r>
+            <a:endParaRPr lang="en-GB" sz="1600" b="1" dirty="0">
+              <a:solidFill>
+                <a:schemeClr val="tx1"/>
+              </a:solidFill>
+              <a:latin typeface="Gill Sans MT" pitchFamily="34" charset="0"/>
+              <a:cs typeface="Courier New" pitchFamily="49" charset="0"/>
             </a:endParaRPr>
           </a:p>
         </p:txBody>
       </p:sp>
       <p:sp>
         <p:nvSpPr>
-          <p:cNvPr id="71" name="Rounded Rectangle 70"/>
+          <p:cNvPr id="13" name="Rounded Rectangle 70">
+            <a:extLst>
+              <a:ext uri="{FF2B5EF4-FFF2-40B4-BE49-F238E27FC236}">
+                <a16:creationId xmlns:a16="http://schemas.microsoft.com/office/drawing/2014/main" id="{29444BA9-E2C8-41A3-879E-B6437B7638CB}"/>
+              </a:ext>
+            </a:extLst>
+          </p:cNvPr>
           <p:cNvSpPr/>
           <p:nvPr/>
         </p:nvSpPr>
         <p:spPr bwMode="auto">
           <a:xfrm>
-            <a:off x="1773049" y="1993225"/>
+            <a:off x="1029879" y="1868211"/>
             <a:ext cx="3689267" cy="433388"/>
           </a:xfrm>
           <a:prstGeom prst="roundRect">
@@ -4093,20 +4072,30 @@
       </p:sp>
       <p:sp>
         <p:nvSpPr>
-          <p:cNvPr id="234" name="Rectangle 233"/>
+          <p:cNvPr id="23" name="Rectangle 22">
+            <a:extLst>
+              <a:ext uri="{FF2B5EF4-FFF2-40B4-BE49-F238E27FC236}">
+                <a16:creationId xmlns:a16="http://schemas.microsoft.com/office/drawing/2014/main" id="{81D29FB7-1AFE-4D73-8AA9-E4FE050B42A9}"/>
+              </a:ext>
+            </a:extLst>
+          </p:cNvPr>
           <p:cNvSpPr/>
           <p:nvPr/>
         </p:nvSpPr>
         <p:spPr bwMode="auto">
           <a:xfrm>
-            <a:off x="2050473" y="2435349"/>
+            <a:off x="1307303" y="2310335"/>
             <a:ext cx="3134421" cy="2744181"/>
           </a:xfrm>
           <a:prstGeom prst="rect">
             <a:avLst/>
           </a:prstGeom>
-          <a:noFill/>
-          <a:ln w="19050">
+          <a:solidFill>
+            <a:schemeClr val="bg1">
+              <a:lumMod val="95000"/>
+            </a:schemeClr>
+          </a:solidFill>
+          <a:ln w="25400">
             <a:solidFill>
               <a:schemeClr val="tx1"/>
             </a:solidFill>
@@ -4141,187 +4130,10 @@
       </p:sp>
       <p:sp>
         <p:nvSpPr>
-          <p:cNvPr id="133" name="TextBox 132">
+          <p:cNvPr id="25" name="Rounded Rectangle 70">
             <a:extLst>
               <a:ext uri="{FF2B5EF4-FFF2-40B4-BE49-F238E27FC236}">
-                <a16:creationId xmlns:a16="http://schemas.microsoft.com/office/drawing/2014/main" id="{AA5CEDF5-5997-4DF2-96EA-E00B6FE21B62}"/>
-              </a:ext>
-            </a:extLst>
-          </p:cNvPr>
-          <p:cNvSpPr txBox="1"/>
-          <p:nvPr/>
-        </p:nvSpPr>
-        <p:spPr bwMode="auto">
-          <a:xfrm>
-            <a:off x="3320036" y="3594888"/>
-            <a:ext cx="1641380" cy="461665"/>
-          </a:xfrm>
-          <a:prstGeom prst="rect">
-            <a:avLst/>
-          </a:prstGeom>
-          <a:solidFill>
-            <a:schemeClr val="bg1">
-              <a:lumMod val="85000"/>
-            </a:schemeClr>
-          </a:solidFill>
-          <a:ln>
-            <a:noFill/>
-          </a:ln>
-        </p:spPr>
-        <p:txBody>
-          <a:bodyPr wrap="square" rIns="144000">
-            <a:spAutoFit/>
-          </a:bodyPr>
-          <a:lstStyle/>
-          <a:p>
-            <a:pPr algn="ctr">
-              <a:defRPr/>
-            </a:pPr>
-            <a:r>
-              <a:rPr lang="en-GB" sz="1200" b="1" dirty="0">
-                <a:latin typeface="+mn-lt"/>
-              </a:rPr>
-              <a:t>Master Input  Slave Output (MISO)</a:t>
-            </a:r>
-          </a:p>
-        </p:txBody>
-      </p:sp>
-      <p:sp>
-        <p:nvSpPr>
-          <p:cNvPr id="134" name="TextBox 133">
-            <a:extLst>
-              <a:ext uri="{FF2B5EF4-FFF2-40B4-BE49-F238E27FC236}">
-                <a16:creationId xmlns:a16="http://schemas.microsoft.com/office/drawing/2014/main" id="{A5185933-3B05-49D7-88D9-3F9AD5C49034}"/>
-              </a:ext>
-            </a:extLst>
-          </p:cNvPr>
-          <p:cNvSpPr txBox="1"/>
-          <p:nvPr/>
-        </p:nvSpPr>
-        <p:spPr bwMode="auto">
-          <a:xfrm>
-            <a:off x="3320036" y="4129890"/>
-            <a:ext cx="1641379" cy="288000"/>
-          </a:xfrm>
-          <a:prstGeom prst="rect">
-            <a:avLst/>
-          </a:prstGeom>
-          <a:solidFill>
-            <a:schemeClr val="bg1">
-              <a:lumMod val="85000"/>
-            </a:schemeClr>
-          </a:solidFill>
-          <a:ln>
-            <a:noFill/>
-          </a:ln>
-        </p:spPr>
-        <p:txBody>
-          <a:bodyPr wrap="square" rIns="144000">
-            <a:spAutoFit/>
-          </a:bodyPr>
-          <a:lstStyle/>
-          <a:p>
-            <a:pPr algn="ctr">
-              <a:defRPr/>
-            </a:pPr>
-            <a:r>
-              <a:rPr lang="en-US" sz="1200" b="1" dirty="0">
-                <a:latin typeface="+mn-lt"/>
-              </a:rPr>
-              <a:t>Slave Select (SS)</a:t>
-            </a:r>
-            <a:endParaRPr lang="en-GB" sz="1200" b="1" dirty="0">
-              <a:latin typeface="+mn-lt"/>
-            </a:endParaRPr>
-          </a:p>
-        </p:txBody>
-      </p:sp>
-      <p:sp>
-        <p:nvSpPr>
-          <p:cNvPr id="135" name="TextBox 134">
-            <a:extLst>
-              <a:ext uri="{FF2B5EF4-FFF2-40B4-BE49-F238E27FC236}">
-                <a16:creationId xmlns:a16="http://schemas.microsoft.com/office/drawing/2014/main" id="{3C9B1939-EB6D-4D12-9666-6E28C905B66E}"/>
-              </a:ext>
-            </a:extLst>
-          </p:cNvPr>
-          <p:cNvSpPr txBox="1"/>
-          <p:nvPr/>
-        </p:nvSpPr>
-        <p:spPr bwMode="auto">
-          <a:xfrm>
-            <a:off x="3320035" y="4752735"/>
-            <a:ext cx="1641380" cy="288000"/>
-          </a:xfrm>
-          <a:prstGeom prst="rect">
-            <a:avLst/>
-          </a:prstGeom>
-          <a:solidFill>
-            <a:schemeClr val="bg1">
-              <a:lumMod val="85000"/>
-            </a:schemeClr>
-          </a:solidFill>
-          <a:ln>
-            <a:noFill/>
-          </a:ln>
-        </p:spPr>
-        <p:txBody>
-          <a:bodyPr wrap="square" rIns="144000">
-            <a:spAutoFit/>
-          </a:bodyPr>
-          <a:lstStyle/>
-          <a:p>
-            <a:pPr algn="ctr">
-              <a:defRPr/>
-            </a:pPr>
-            <a:r>
-              <a:rPr lang="en-US" sz="1200" b="1" dirty="0">
-                <a:latin typeface="+mn-lt"/>
-              </a:rPr>
-              <a:t>Ground (GND)</a:t>
-            </a:r>
-            <a:endParaRPr lang="en-GB" sz="1200" b="1" dirty="0">
-              <a:latin typeface="+mn-lt"/>
-            </a:endParaRPr>
-          </a:p>
-        </p:txBody>
-      </p:sp>
-      <p:sp>
-        <p:nvSpPr>
-          <p:cNvPr id="238" name="Title 237">
-            <a:extLst>
-              <a:ext uri="{FF2B5EF4-FFF2-40B4-BE49-F238E27FC236}">
-                <a16:creationId xmlns:a16="http://schemas.microsoft.com/office/drawing/2014/main" id="{80D63FCD-51E2-4072-B3AA-78FBCF1C481F}"/>
-              </a:ext>
-            </a:extLst>
-          </p:cNvPr>
-          <p:cNvSpPr>
-            <a:spLocks noGrp="1"/>
-          </p:cNvSpPr>
-          <p:nvPr>
-            <p:ph type="title"/>
-          </p:nvPr>
-        </p:nvSpPr>
-        <p:spPr/>
-        <p:txBody>
-          <a:bodyPr>
-            <a:normAutofit fontScale="90000"/>
-          </a:bodyPr>
-          <a:lstStyle/>
-          <a:p>
-            <a:r>
-              <a:rPr lang="en-US" dirty="0"/>
-              <a:t>Test Mode Loopback pin connections</a:t>
-            </a:r>
-          </a:p>
-        </p:txBody>
-      </p:sp>
-      <p:sp>
-        <p:nvSpPr>
-          <p:cNvPr id="171" name="Rounded Rectangle 70">
-            <a:extLst>
-              <a:ext uri="{FF2B5EF4-FFF2-40B4-BE49-F238E27FC236}">
-                <a16:creationId xmlns:a16="http://schemas.microsoft.com/office/drawing/2014/main" id="{B1D1947C-EB88-434B-9AA6-313F41007DC2}"/>
+                <a16:creationId xmlns:a16="http://schemas.microsoft.com/office/drawing/2014/main" id="{66C306D5-921A-4EE8-A811-767763892A9F}"/>
               </a:ext>
             </a:extLst>
           </p:cNvPr>
@@ -4330,7 +4142,7 @@
         </p:nvSpPr>
         <p:spPr bwMode="auto">
           <a:xfrm>
-            <a:off x="1978244" y="2635207"/>
+            <a:off x="890271" y="2452809"/>
             <a:ext cx="1800225" cy="433388"/>
           </a:xfrm>
           <a:prstGeom prst="roundRect">
@@ -4386,10 +4198,264 @@
       </p:sp>
       <p:sp>
         <p:nvSpPr>
-          <p:cNvPr id="244" name="Rectangle 243">
+          <p:cNvPr id="26" name="TextBox 25">
             <a:extLst>
               <a:ext uri="{FF2B5EF4-FFF2-40B4-BE49-F238E27FC236}">
-                <a16:creationId xmlns:a16="http://schemas.microsoft.com/office/drawing/2014/main" id="{1BA3A443-9FAB-46B5-97A7-872D2DDDF126}"/>
+                <a16:creationId xmlns:a16="http://schemas.microsoft.com/office/drawing/2014/main" id="{1B684049-8A4B-4362-9EB9-80F0152DAC40}"/>
+              </a:ext>
+            </a:extLst>
+          </p:cNvPr>
+          <p:cNvSpPr txBox="1"/>
+          <p:nvPr/>
+        </p:nvSpPr>
+        <p:spPr bwMode="auto">
+          <a:xfrm>
+            <a:off x="2576865" y="2934872"/>
+            <a:ext cx="1641380" cy="461665"/>
+          </a:xfrm>
+          <a:prstGeom prst="rect">
+            <a:avLst/>
+          </a:prstGeom>
+          <a:solidFill>
+            <a:schemeClr val="bg1">
+              <a:lumMod val="85000"/>
+            </a:schemeClr>
+          </a:solidFill>
+          <a:ln w="19050">
+            <a:solidFill>
+              <a:schemeClr val="accent1"/>
+            </a:solidFill>
+          </a:ln>
+        </p:spPr>
+        <p:txBody>
+          <a:bodyPr wrap="square" rIns="144000">
+            <a:spAutoFit/>
+          </a:bodyPr>
+          <a:lstStyle/>
+          <a:p>
+            <a:pPr algn="ctr">
+              <a:defRPr/>
+            </a:pPr>
+            <a:r>
+              <a:rPr lang="en-GB" sz="1200" b="1" dirty="0">
+                <a:latin typeface="+mn-lt"/>
+              </a:rPr>
+              <a:t>Master Output  Slave Input (MOSI)</a:t>
+            </a:r>
+          </a:p>
+        </p:txBody>
+      </p:sp>
+      <p:sp>
+        <p:nvSpPr>
+          <p:cNvPr id="27" name="TextBox 26">
+            <a:extLst>
+              <a:ext uri="{FF2B5EF4-FFF2-40B4-BE49-F238E27FC236}">
+                <a16:creationId xmlns:a16="http://schemas.microsoft.com/office/drawing/2014/main" id="{68C52518-EAE1-4B1F-ADE2-557F2AF218A5}"/>
+              </a:ext>
+            </a:extLst>
+          </p:cNvPr>
+          <p:cNvSpPr txBox="1"/>
+          <p:nvPr/>
+        </p:nvSpPr>
+        <p:spPr bwMode="auto">
+          <a:xfrm>
+            <a:off x="2576865" y="2549521"/>
+            <a:ext cx="1641380" cy="288000"/>
+          </a:xfrm>
+          <a:prstGeom prst="rect">
+            <a:avLst/>
+          </a:prstGeom>
+          <a:solidFill>
+            <a:schemeClr val="bg1">
+              <a:lumMod val="85000"/>
+            </a:schemeClr>
+          </a:solidFill>
+          <a:ln w="19050">
+            <a:solidFill>
+              <a:schemeClr val="accent1"/>
+            </a:solidFill>
+          </a:ln>
+        </p:spPr>
+        <p:txBody>
+          <a:bodyPr wrap="square" rIns="144000">
+            <a:spAutoFit/>
+          </a:bodyPr>
+          <a:lstStyle/>
+          <a:p>
+            <a:pPr algn="ctr">
+              <a:defRPr/>
+            </a:pPr>
+            <a:r>
+              <a:rPr lang="en-US" sz="1200" b="1" dirty="0">
+                <a:latin typeface="+mn-lt"/>
+              </a:rPr>
+              <a:t>SPI Clock (SCK)</a:t>
+            </a:r>
+            <a:endParaRPr lang="en-GB" sz="1200" b="1" dirty="0">
+              <a:latin typeface="+mn-lt"/>
+            </a:endParaRPr>
+          </a:p>
+        </p:txBody>
+      </p:sp>
+      <p:sp>
+        <p:nvSpPr>
+          <p:cNvPr id="28" name="TextBox 27">
+            <a:extLst>
+              <a:ext uri="{FF2B5EF4-FFF2-40B4-BE49-F238E27FC236}">
+                <a16:creationId xmlns:a16="http://schemas.microsoft.com/office/drawing/2014/main" id="{206757FB-D8BF-426A-89E7-3BDF7CAE3FBE}"/>
+              </a:ext>
+            </a:extLst>
+          </p:cNvPr>
+          <p:cNvSpPr txBox="1"/>
+          <p:nvPr/>
+        </p:nvSpPr>
+        <p:spPr bwMode="auto">
+          <a:xfrm>
+            <a:off x="2576865" y="3478549"/>
+            <a:ext cx="1641380" cy="461665"/>
+          </a:xfrm>
+          <a:prstGeom prst="rect">
+            <a:avLst/>
+          </a:prstGeom>
+          <a:solidFill>
+            <a:schemeClr val="bg1">
+              <a:lumMod val="85000"/>
+            </a:schemeClr>
+          </a:solidFill>
+          <a:ln w="19050">
+            <a:solidFill>
+              <a:schemeClr val="accent1"/>
+            </a:solidFill>
+          </a:ln>
+        </p:spPr>
+        <p:txBody>
+          <a:bodyPr wrap="square" rIns="144000">
+            <a:spAutoFit/>
+          </a:bodyPr>
+          <a:lstStyle/>
+          <a:p>
+            <a:pPr algn="ctr">
+              <a:defRPr/>
+            </a:pPr>
+            <a:r>
+              <a:rPr lang="en-GB" sz="1200" b="1" dirty="0">
+                <a:latin typeface="+mn-lt"/>
+              </a:rPr>
+              <a:t>Master Input  Slave Output (MISO)</a:t>
+            </a:r>
+          </a:p>
+        </p:txBody>
+      </p:sp>
+      <p:sp>
+        <p:nvSpPr>
+          <p:cNvPr id="29" name="TextBox 28">
+            <a:extLst>
+              <a:ext uri="{FF2B5EF4-FFF2-40B4-BE49-F238E27FC236}">
+                <a16:creationId xmlns:a16="http://schemas.microsoft.com/office/drawing/2014/main" id="{9BF67D25-DF14-4DFC-B77E-457F323ACA63}"/>
+              </a:ext>
+            </a:extLst>
+          </p:cNvPr>
+          <p:cNvSpPr txBox="1"/>
+          <p:nvPr/>
+        </p:nvSpPr>
+        <p:spPr bwMode="auto">
+          <a:xfrm>
+            <a:off x="2576866" y="4014447"/>
+            <a:ext cx="1641379" cy="288000"/>
+          </a:xfrm>
+          <a:prstGeom prst="rect">
+            <a:avLst/>
+          </a:prstGeom>
+          <a:solidFill>
+            <a:schemeClr val="bg1">
+              <a:lumMod val="85000"/>
+            </a:schemeClr>
+          </a:solidFill>
+          <a:ln w="19050">
+            <a:solidFill>
+              <a:schemeClr val="accent1"/>
+            </a:solidFill>
+          </a:ln>
+        </p:spPr>
+        <p:txBody>
+          <a:bodyPr wrap="square" rIns="144000">
+            <a:spAutoFit/>
+          </a:bodyPr>
+          <a:lstStyle/>
+          <a:p>
+            <a:pPr algn="ctr">
+              <a:defRPr/>
+            </a:pPr>
+            <a:r>
+              <a:rPr lang="en-US" sz="1200" b="1" dirty="0">
+                <a:latin typeface="+mn-lt"/>
+              </a:rPr>
+              <a:t>Slave Select (SS)</a:t>
+            </a:r>
+            <a:endParaRPr lang="en-GB" sz="1200" b="1" dirty="0">
+              <a:latin typeface="+mn-lt"/>
+            </a:endParaRPr>
+          </a:p>
+        </p:txBody>
+      </p:sp>
+      <p:sp>
+        <p:nvSpPr>
+          <p:cNvPr id="30" name="TextBox 29">
+            <a:extLst>
+              <a:ext uri="{FF2B5EF4-FFF2-40B4-BE49-F238E27FC236}">
+                <a16:creationId xmlns:a16="http://schemas.microsoft.com/office/drawing/2014/main" id="{EE18179E-8B0D-424F-9995-D185D877077A}"/>
+              </a:ext>
+            </a:extLst>
+          </p:cNvPr>
+          <p:cNvSpPr txBox="1"/>
+          <p:nvPr/>
+        </p:nvSpPr>
+        <p:spPr bwMode="auto">
+          <a:xfrm>
+            <a:off x="2576865" y="4619928"/>
+            <a:ext cx="1641380" cy="288000"/>
+          </a:xfrm>
+          <a:prstGeom prst="rect">
+            <a:avLst/>
+          </a:prstGeom>
+          <a:solidFill>
+            <a:schemeClr val="bg1">
+              <a:lumMod val="85000"/>
+            </a:schemeClr>
+          </a:solidFill>
+          <a:ln w="19050">
+            <a:solidFill>
+              <a:schemeClr val="accent1"/>
+            </a:solidFill>
+          </a:ln>
+        </p:spPr>
+        <p:txBody>
+          <a:bodyPr wrap="square" rIns="144000">
+            <a:spAutoFit/>
+          </a:bodyPr>
+          <a:lstStyle/>
+          <a:p>
+            <a:pPr algn="ctr">
+              <a:defRPr/>
+            </a:pPr>
+            <a:r>
+              <a:rPr lang="en-US" sz="1200" b="1" dirty="0">
+                <a:latin typeface="+mn-lt"/>
+              </a:rPr>
+              <a:t>Ground (GND)</a:t>
+            </a:r>
+            <a:endParaRPr lang="en-GB" sz="1200" b="1" dirty="0">
+              <a:latin typeface="+mn-lt"/>
+            </a:endParaRPr>
+          </a:p>
+        </p:txBody>
+      </p:sp>
+      <p:sp>
+        <p:nvSpPr>
+          <p:cNvPr id="31" name="Rectangle 30">
+            <a:extLst>
+              <a:ext uri="{FF2B5EF4-FFF2-40B4-BE49-F238E27FC236}">
+                <a16:creationId xmlns:a16="http://schemas.microsoft.com/office/drawing/2014/main" id="{4BE14EF6-8641-4D58-9099-86C425BF08F5}"/>
               </a:ext>
             </a:extLst>
           </p:cNvPr>
@@ -4398,14 +4464,14 @@
         </p:nvSpPr>
         <p:spPr>
           <a:xfrm>
-            <a:off x="2373745" y="2602688"/>
-            <a:ext cx="2679135" cy="1907400"/>
+            <a:off x="1414463" y="2445599"/>
+            <a:ext cx="2914651" cy="1952172"/>
           </a:xfrm>
           <a:prstGeom prst="rect">
             <a:avLst/>
           </a:prstGeom>
           <a:noFill/>
-          <a:ln>
+          <a:ln w="19050">
             <a:solidFill>
               <a:schemeClr val="accent1"/>
             </a:solidFill>
@@ -4437,33 +4503,31 @@
       </p:sp>
       <p:cxnSp>
         <p:nvCxnSpPr>
-          <p:cNvPr id="224" name="Connector: Elbow 223">
+          <p:cNvPr id="24" name="Connector: Elbow 23">
             <a:extLst>
               <a:ext uri="{FF2B5EF4-FFF2-40B4-BE49-F238E27FC236}">
-                <a16:creationId xmlns:a16="http://schemas.microsoft.com/office/drawing/2014/main" id="{29451D30-A329-4B27-8FF5-EE92334462A6}"/>
+                <a16:creationId xmlns:a16="http://schemas.microsoft.com/office/drawing/2014/main" id="{C5B443AB-B012-4F72-AEBD-F7F8C240277C}"/>
               </a:ext>
             </a:extLst>
           </p:cNvPr>
           <p:cNvCxnSpPr>
             <a:cxnSpLocks/>
-            <a:stCxn id="133" idx="3"/>
-            <a:endCxn id="6" idx="3"/>
           </p:cNvCxnSpPr>
           <p:nvPr/>
         </p:nvCxnSpPr>
         <p:spPr>
           <a:xfrm flipV="1">
-            <a:off x="4961416" y="3290719"/>
-            <a:ext cx="4190" cy="535002"/>
+            <a:off x="4217127" y="3174181"/>
+            <a:ext cx="6134" cy="518459"/>
           </a:xfrm>
           <a:prstGeom prst="bentConnector3">
             <a:avLst>
-              <a:gd name="adj1" fmla="val 11352697"/>
+              <a:gd name="adj1" fmla="val 5557150"/>
             </a:avLst>
           </a:prstGeom>
           <a:ln>
-            <a:headEnd type="triangle"/>
-            <a:tailEnd type="triangle"/>
+            <a:headEnd type="none"/>
+            <a:tailEnd type="none"/>
           </a:ln>
         </p:spPr>
         <p:style>
@@ -4543,10 +4607,10 @@
       </p:sp>
       <p:sp>
         <p:nvSpPr>
-          <p:cNvPr id="28" name="Rectangle 27">
+          <p:cNvPr id="35" name="Rounded Rectangle 70">
             <a:extLst>
               <a:ext uri="{FF2B5EF4-FFF2-40B4-BE49-F238E27FC236}">
-                <a16:creationId xmlns:a16="http://schemas.microsoft.com/office/drawing/2014/main" id="{4E3D0878-BD2F-4AB7-B44F-A4E93602F0C4}"/>
+                <a16:creationId xmlns:a16="http://schemas.microsoft.com/office/drawing/2014/main" id="{B6C027C0-6422-4774-B887-8A2D3029E246}"/>
               </a:ext>
             </a:extLst>
           </p:cNvPr>
@@ -4555,18 +4619,14 @@
         </p:nvSpPr>
         <p:spPr bwMode="auto">
           <a:xfrm>
-            <a:off x="1307304" y="2309054"/>
-            <a:ext cx="3134420" cy="2738007"/>
-          </a:xfrm>
-          <a:prstGeom prst="rect">
+            <a:off x="1029879" y="1868211"/>
+            <a:ext cx="3689267" cy="433388"/>
+          </a:xfrm>
+          <a:prstGeom prst="roundRect">
             <a:avLst/>
           </a:prstGeom>
-          <a:solidFill>
-            <a:schemeClr val="bg1">
-              <a:lumMod val="95000"/>
-            </a:schemeClr>
-          </a:solidFill>
-          <a:ln w="19050">
+          <a:noFill/>
+          <a:ln w="12700">
             <a:noFill/>
           </a:ln>
         </p:spPr>
@@ -4590,133 +4650,68 @@
           <a:bodyPr anchor="ctr"/>
           <a:lstStyle/>
           <a:p>
-            <a:pPr algn="r">
+            <a:pPr algn="ctr">
               <a:defRPr/>
             </a:pPr>
-            <a:endParaRPr lang="en-GB" dirty="0"/>
-          </a:p>
-        </p:txBody>
-      </p:sp>
-      <p:sp>
-        <p:nvSpPr>
-          <p:cNvPr id="29" name="TextBox 28">
+            <a:r>
+              <a:rPr lang="en-US" sz="1600" b="1">
+                <a:solidFill>
+                  <a:schemeClr val="tx1"/>
+                </a:solidFill>
+                <a:latin typeface="Gill Sans MT" pitchFamily="34" charset="0"/>
+                <a:cs typeface="Courier New" pitchFamily="49" charset="0"/>
+              </a:rPr>
+              <a:t>Device (Driver) </a:t>
+            </a:r>
+            <a:r>
+              <a:rPr lang="en-US" sz="1600" b="1" dirty="0">
+                <a:solidFill>
+                  <a:schemeClr val="tx1"/>
+                </a:solidFill>
+                <a:latin typeface="Gill Sans MT" pitchFamily="34" charset="0"/>
+                <a:cs typeface="Courier New" pitchFamily="49" charset="0"/>
+              </a:rPr>
+              <a:t>Under Test (DUT)</a:t>
+            </a:r>
+            <a:endParaRPr lang="en-GB" sz="1600" b="1" dirty="0">
+              <a:solidFill>
+                <a:schemeClr val="tx1"/>
+              </a:solidFill>
+              <a:latin typeface="Gill Sans MT" pitchFamily="34" charset="0"/>
+              <a:cs typeface="Courier New" pitchFamily="49" charset="0"/>
+            </a:endParaRPr>
+          </a:p>
+        </p:txBody>
+      </p:sp>
+      <p:sp>
+        <p:nvSpPr>
+          <p:cNvPr id="36" name="Rectangle 35">
             <a:extLst>
               <a:ext uri="{FF2B5EF4-FFF2-40B4-BE49-F238E27FC236}">
-                <a16:creationId xmlns:a16="http://schemas.microsoft.com/office/drawing/2014/main" id="{26428358-90C4-4CAA-B022-EF9478171E1A}"/>
+                <a16:creationId xmlns:a16="http://schemas.microsoft.com/office/drawing/2014/main" id="{EE26DCF4-8DA5-4003-93DC-9F7C84C4E85A}"/>
               </a:ext>
             </a:extLst>
           </p:cNvPr>
-          <p:cNvSpPr txBox="1"/>
+          <p:cNvSpPr/>
           <p:nvPr/>
         </p:nvSpPr>
         <p:spPr bwMode="auto">
           <a:xfrm>
-            <a:off x="2581056" y="2934872"/>
-            <a:ext cx="1641380" cy="461665"/>
+            <a:off x="1307303" y="2310335"/>
+            <a:ext cx="3134421" cy="2744181"/>
           </a:xfrm>
           <a:prstGeom prst="rect">
             <a:avLst/>
           </a:prstGeom>
           <a:solidFill>
             <a:schemeClr val="bg1">
-              <a:lumMod val="85000"/>
+              <a:lumMod val="95000"/>
             </a:schemeClr>
           </a:solidFill>
-          <a:ln>
-            <a:noFill/>
-          </a:ln>
-        </p:spPr>
-        <p:txBody>
-          <a:bodyPr wrap="square" rIns="144000">
-            <a:spAutoFit/>
-          </a:bodyPr>
-          <a:lstStyle/>
-          <a:p>
-            <a:pPr algn="ctr">
-              <a:defRPr/>
-            </a:pPr>
-            <a:r>
-              <a:rPr lang="en-GB" sz="1200" b="1" dirty="0">
-                <a:latin typeface="+mn-lt"/>
-              </a:rPr>
-              <a:t>Master Output  Slave Input (MOSI)</a:t>
-            </a:r>
-          </a:p>
-        </p:txBody>
-      </p:sp>
-      <p:sp>
-        <p:nvSpPr>
-          <p:cNvPr id="34" name="TextBox 33">
-            <a:extLst>
-              <a:ext uri="{FF2B5EF4-FFF2-40B4-BE49-F238E27FC236}">
-                <a16:creationId xmlns:a16="http://schemas.microsoft.com/office/drawing/2014/main" id="{89A48D16-2712-41B9-A4F8-89C36054F730}"/>
-              </a:ext>
-            </a:extLst>
-          </p:cNvPr>
-          <p:cNvSpPr txBox="1"/>
-          <p:nvPr/>
-        </p:nvSpPr>
-        <p:spPr bwMode="auto">
-          <a:xfrm>
-            <a:off x="2576865" y="2549521"/>
-            <a:ext cx="1641380" cy="288000"/>
-          </a:xfrm>
-          <a:prstGeom prst="rect">
-            <a:avLst/>
-          </a:prstGeom>
-          <a:solidFill>
-            <a:schemeClr val="bg1">
-              <a:lumMod val="85000"/>
-            </a:schemeClr>
-          </a:solidFill>
-          <a:ln>
-            <a:noFill/>
-          </a:ln>
-        </p:spPr>
-        <p:txBody>
-          <a:bodyPr wrap="square" rIns="144000">
-            <a:spAutoFit/>
-          </a:bodyPr>
-          <a:lstStyle/>
-          <a:p>
-            <a:pPr algn="ctr">
-              <a:defRPr/>
-            </a:pPr>
-            <a:r>
-              <a:rPr lang="en-US" sz="1200" b="1" dirty="0">
-                <a:latin typeface="+mn-lt"/>
-              </a:rPr>
-              <a:t>SPI Clock (SCK)</a:t>
-            </a:r>
-            <a:endParaRPr lang="en-GB" sz="1200" b="1" dirty="0">
-              <a:latin typeface="+mn-lt"/>
-            </a:endParaRPr>
-          </a:p>
-        </p:txBody>
-      </p:sp>
-      <p:sp>
-        <p:nvSpPr>
-          <p:cNvPr id="35" name="Rounded Rectangle 70">
-            <a:extLst>
-              <a:ext uri="{FF2B5EF4-FFF2-40B4-BE49-F238E27FC236}">
-                <a16:creationId xmlns:a16="http://schemas.microsoft.com/office/drawing/2014/main" id="{B6C027C0-6422-4774-B887-8A2D3029E246}"/>
-              </a:ext>
-            </a:extLst>
-          </p:cNvPr>
-          <p:cNvSpPr/>
-          <p:nvPr/>
-        </p:nvSpPr>
-        <p:spPr bwMode="auto">
-          <a:xfrm>
-            <a:off x="1029879" y="1868211"/>
-            <a:ext cx="3689267" cy="433388"/>
-          </a:xfrm>
-          <a:prstGeom prst="roundRect">
-            <a:avLst/>
-          </a:prstGeom>
-          <a:noFill/>
-          <a:ln w="12700">
-            <a:noFill/>
+          <a:ln w="25400">
+            <a:solidFill>
+              <a:schemeClr val="tx1"/>
+            </a:solidFill>
           </a:ln>
         </p:spPr>
         <p:style>
@@ -4739,45 +4734,19 @@
           <a:bodyPr anchor="ctr"/>
           <a:lstStyle/>
           <a:p>
-            <a:pPr algn="ctr">
+            <a:pPr algn="r">
               <a:defRPr/>
             </a:pPr>
-            <a:r>
-              <a:rPr lang="en-US" sz="1600" b="1">
-                <a:solidFill>
-                  <a:schemeClr val="tx1"/>
-                </a:solidFill>
-                <a:latin typeface="Gill Sans MT" pitchFamily="34" charset="0"/>
-                <a:cs typeface="Courier New" pitchFamily="49" charset="0"/>
-              </a:rPr>
-              <a:t>Device (Driver) </a:t>
-            </a:r>
-            <a:r>
-              <a:rPr lang="en-US" sz="1600" b="1" dirty="0">
-                <a:solidFill>
-                  <a:schemeClr val="tx1"/>
-                </a:solidFill>
-                <a:latin typeface="Gill Sans MT" pitchFamily="34" charset="0"/>
-                <a:cs typeface="Courier New" pitchFamily="49" charset="0"/>
-              </a:rPr>
-              <a:t>Under Test (DUT)</a:t>
-            </a:r>
-            <a:endParaRPr lang="en-GB" sz="1600" b="1" dirty="0">
-              <a:solidFill>
-                <a:schemeClr val="tx1"/>
-              </a:solidFill>
-              <a:latin typeface="Gill Sans MT" pitchFamily="34" charset="0"/>
-              <a:cs typeface="Courier New" pitchFamily="49" charset="0"/>
-            </a:endParaRPr>
-          </a:p>
-        </p:txBody>
-      </p:sp>
-      <p:sp>
-        <p:nvSpPr>
-          <p:cNvPr id="36" name="Rectangle 35">
+            <a:endParaRPr lang="en-GB" dirty="0"/>
+          </a:p>
+        </p:txBody>
+      </p:sp>
+      <p:sp>
+        <p:nvSpPr>
+          <p:cNvPr id="40" name="Rounded Rectangle 70">
             <a:extLst>
               <a:ext uri="{FF2B5EF4-FFF2-40B4-BE49-F238E27FC236}">
-                <a16:creationId xmlns:a16="http://schemas.microsoft.com/office/drawing/2014/main" id="{EE26DCF4-8DA5-4003-93DC-9F7C84C4E85A}"/>
+                <a16:creationId xmlns:a16="http://schemas.microsoft.com/office/drawing/2014/main" id="{B9981047-83B9-43C0-9215-84310FDF9743}"/>
               </a:ext>
             </a:extLst>
           </p:cNvPr>
@@ -4786,17 +4755,15 @@
         </p:nvSpPr>
         <p:spPr bwMode="auto">
           <a:xfrm>
-            <a:off x="1307303" y="2310335"/>
-            <a:ext cx="3134421" cy="2744181"/>
-          </a:xfrm>
-          <a:prstGeom prst="rect">
+            <a:off x="890271" y="2452809"/>
+            <a:ext cx="1800225" cy="433388"/>
+          </a:xfrm>
+          <a:prstGeom prst="roundRect">
             <a:avLst/>
           </a:prstGeom>
           <a:noFill/>
-          <a:ln w="19050">
-            <a:solidFill>
-              <a:schemeClr val="tx1"/>
-            </a:solidFill>
+          <a:ln w="12700">
+            <a:noFill/>
           </a:ln>
         </p:spPr>
         <p:style>
@@ -4819,166 +4786,35 @@
           <a:bodyPr anchor="ctr"/>
           <a:lstStyle/>
           <a:p>
-            <a:pPr algn="r">
-              <a:defRPr/>
-            </a:pPr>
-            <a:endParaRPr lang="en-GB" dirty="0"/>
-          </a:p>
-        </p:txBody>
-      </p:sp>
-      <p:sp>
-        <p:nvSpPr>
-          <p:cNvPr id="37" name="TextBox 36">
-            <a:extLst>
-              <a:ext uri="{FF2B5EF4-FFF2-40B4-BE49-F238E27FC236}">
-                <a16:creationId xmlns:a16="http://schemas.microsoft.com/office/drawing/2014/main" id="{01701BDF-CF48-4C90-8EE1-9A5C98BACD5A}"/>
-              </a:ext>
-            </a:extLst>
-          </p:cNvPr>
-          <p:cNvSpPr txBox="1"/>
-          <p:nvPr/>
-        </p:nvSpPr>
-        <p:spPr bwMode="auto">
-          <a:xfrm>
-            <a:off x="2576866" y="3469874"/>
-            <a:ext cx="1641380" cy="461665"/>
-          </a:xfrm>
-          <a:prstGeom prst="rect">
-            <a:avLst/>
-          </a:prstGeom>
-          <a:solidFill>
-            <a:schemeClr val="bg1">
-              <a:lumMod val="85000"/>
-            </a:schemeClr>
-          </a:solidFill>
-          <a:ln>
-            <a:noFill/>
-          </a:ln>
-        </p:spPr>
-        <p:txBody>
-          <a:bodyPr wrap="square" rIns="144000">
-            <a:spAutoFit/>
-          </a:bodyPr>
-          <a:lstStyle/>
-          <a:p>
             <a:pPr algn="ctr">
               <a:defRPr/>
             </a:pPr>
             <a:r>
-              <a:rPr lang="en-GB" sz="1200" b="1" dirty="0">
-                <a:latin typeface="+mn-lt"/>
+              <a:rPr lang="en-US" sz="3200" b="1" dirty="0">
+                <a:solidFill>
+                  <a:schemeClr val="tx1"/>
+                </a:solidFill>
+                <a:latin typeface="Gill Sans MT" pitchFamily="34" charset="0"/>
+                <a:cs typeface="Courier New" pitchFamily="49" charset="0"/>
               </a:rPr>
-              <a:t>Master Input  Slave Output (MISO)</a:t>
-            </a:r>
-          </a:p>
-        </p:txBody>
-      </p:sp>
-      <p:sp>
-        <p:nvSpPr>
-          <p:cNvPr id="38" name="TextBox 37">
+              <a:t>SPI</a:t>
+            </a:r>
+            <a:endParaRPr lang="en-GB" sz="3200" b="1" dirty="0">
+              <a:solidFill>
+                <a:schemeClr val="tx1"/>
+              </a:solidFill>
+              <a:latin typeface="Gill Sans MT" pitchFamily="34" charset="0"/>
+              <a:cs typeface="Courier New" pitchFamily="49" charset="0"/>
+            </a:endParaRPr>
+          </a:p>
+        </p:txBody>
+      </p:sp>
+      <p:sp>
+        <p:nvSpPr>
+          <p:cNvPr id="48" name="Rounded Rectangle 70">
             <a:extLst>
               <a:ext uri="{FF2B5EF4-FFF2-40B4-BE49-F238E27FC236}">
-                <a16:creationId xmlns:a16="http://schemas.microsoft.com/office/drawing/2014/main" id="{C33D8BEB-D38E-42BD-9053-CF3047346ADB}"/>
-              </a:ext>
-            </a:extLst>
-          </p:cNvPr>
-          <p:cNvSpPr txBox="1"/>
-          <p:nvPr/>
-        </p:nvSpPr>
-        <p:spPr bwMode="auto">
-          <a:xfrm>
-            <a:off x="2576866" y="4004876"/>
-            <a:ext cx="1641379" cy="288000"/>
-          </a:xfrm>
-          <a:prstGeom prst="rect">
-            <a:avLst/>
-          </a:prstGeom>
-          <a:solidFill>
-            <a:schemeClr val="bg1">
-              <a:lumMod val="85000"/>
-            </a:schemeClr>
-          </a:solidFill>
-          <a:ln>
-            <a:noFill/>
-          </a:ln>
-        </p:spPr>
-        <p:txBody>
-          <a:bodyPr wrap="square" rIns="144000">
-            <a:spAutoFit/>
-          </a:bodyPr>
-          <a:lstStyle/>
-          <a:p>
-            <a:pPr algn="ctr">
-              <a:defRPr/>
-            </a:pPr>
-            <a:r>
-              <a:rPr lang="en-US" sz="1200" b="1" dirty="0">
-                <a:latin typeface="+mn-lt"/>
-              </a:rPr>
-              <a:t>Slave Select (SS)</a:t>
-            </a:r>
-            <a:endParaRPr lang="en-GB" sz="1200" b="1" dirty="0">
-              <a:latin typeface="+mn-lt"/>
-            </a:endParaRPr>
-          </a:p>
-        </p:txBody>
-      </p:sp>
-      <p:sp>
-        <p:nvSpPr>
-          <p:cNvPr id="39" name="TextBox 38">
-            <a:extLst>
-              <a:ext uri="{FF2B5EF4-FFF2-40B4-BE49-F238E27FC236}">
-                <a16:creationId xmlns:a16="http://schemas.microsoft.com/office/drawing/2014/main" id="{13D7A0BD-F64F-425E-B650-D9F64065FE3E}"/>
-              </a:ext>
-            </a:extLst>
-          </p:cNvPr>
-          <p:cNvSpPr txBox="1"/>
-          <p:nvPr/>
-        </p:nvSpPr>
-        <p:spPr bwMode="auto">
-          <a:xfrm>
-            <a:off x="2576865" y="4627721"/>
-            <a:ext cx="1641380" cy="288000"/>
-          </a:xfrm>
-          <a:prstGeom prst="rect">
-            <a:avLst/>
-          </a:prstGeom>
-          <a:solidFill>
-            <a:schemeClr val="bg1">
-              <a:lumMod val="85000"/>
-            </a:schemeClr>
-          </a:solidFill>
-          <a:ln>
-            <a:noFill/>
-          </a:ln>
-        </p:spPr>
-        <p:txBody>
-          <a:bodyPr wrap="square" rIns="144000">
-            <a:spAutoFit/>
-          </a:bodyPr>
-          <a:lstStyle/>
-          <a:p>
-            <a:pPr algn="ctr">
-              <a:defRPr/>
-            </a:pPr>
-            <a:r>
-              <a:rPr lang="en-US" sz="1200" b="1" dirty="0">
-                <a:latin typeface="+mn-lt"/>
-              </a:rPr>
-              <a:t>Ground (GND)</a:t>
-            </a:r>
-            <a:endParaRPr lang="en-GB" sz="1200" b="1" dirty="0">
-              <a:latin typeface="+mn-lt"/>
-            </a:endParaRPr>
-          </a:p>
-        </p:txBody>
-      </p:sp>
-      <p:sp>
-        <p:nvSpPr>
-          <p:cNvPr id="40" name="Rounded Rectangle 70">
-            <a:extLst>
-              <a:ext uri="{FF2B5EF4-FFF2-40B4-BE49-F238E27FC236}">
-                <a16:creationId xmlns:a16="http://schemas.microsoft.com/office/drawing/2014/main" id="{B9981047-83B9-43C0-9215-84310FDF9743}"/>
+                <a16:creationId xmlns:a16="http://schemas.microsoft.com/office/drawing/2014/main" id="{5AE1F956-08BD-4BAE-B389-7EA01DC9E2AE}"/>
               </a:ext>
             </a:extLst>
           </p:cNvPr>
@@ -4987,8 +4823,8 @@
         </p:nvSpPr>
         <p:spPr bwMode="auto">
           <a:xfrm>
-            <a:off x="1235074" y="2510193"/>
-            <a:ext cx="1800225" cy="433388"/>
+            <a:off x="5881279" y="1880911"/>
+            <a:ext cx="3689267" cy="433388"/>
           </a:xfrm>
           <a:prstGeom prst="roundRect">
             <a:avLst/>
@@ -5022,16 +4858,16 @@
               <a:defRPr/>
             </a:pPr>
             <a:r>
-              <a:rPr lang="en-US" sz="3200" b="1" dirty="0">
+              <a:rPr lang="en-US" sz="1600" b="1">
                 <a:solidFill>
                   <a:schemeClr val="tx1"/>
                 </a:solidFill>
                 <a:latin typeface="Gill Sans MT" pitchFamily="34" charset="0"/>
                 <a:cs typeface="Courier New" pitchFamily="49" charset="0"/>
               </a:rPr>
-              <a:t>SPI</a:t>
-            </a:r>
-            <a:endParaRPr lang="en-GB" sz="3200" b="1" dirty="0">
+              <a:t>SPI Server</a:t>
+            </a:r>
+            <a:endParaRPr lang="en-GB" sz="1600" b="1" dirty="0">
               <a:solidFill>
                 <a:schemeClr val="tx1"/>
               </a:solidFill>
@@ -5043,71 +4879,20 @@
       </p:sp>
       <p:sp>
         <p:nvSpPr>
-          <p:cNvPr id="41" name="Rectangle 40">
+          <p:cNvPr id="49" name="Rectangle 48">
             <a:extLst>
               <a:ext uri="{FF2B5EF4-FFF2-40B4-BE49-F238E27FC236}">
-                <a16:creationId xmlns:a16="http://schemas.microsoft.com/office/drawing/2014/main" id="{F52EF456-4449-4137-9384-BE71C55D7EDB}"/>
+                <a16:creationId xmlns:a16="http://schemas.microsoft.com/office/drawing/2014/main" id="{8C9CD88D-87F3-4594-A8CC-3B11F5888DC0}"/>
               </a:ext>
             </a:extLst>
           </p:cNvPr>
           <p:cNvSpPr/>
           <p:nvPr/>
         </p:nvSpPr>
-        <p:spPr>
-          <a:xfrm>
-            <a:off x="1630575" y="2477674"/>
-            <a:ext cx="2679135" cy="1907400"/>
-          </a:xfrm>
-          <a:prstGeom prst="rect">
-            <a:avLst/>
-          </a:prstGeom>
-          <a:noFill/>
-          <a:ln>
-            <a:solidFill>
-              <a:schemeClr val="accent1"/>
-            </a:solidFill>
-          </a:ln>
-          <a:effectLst/>
-        </p:spPr>
-        <p:style>
-          <a:lnRef idx="1">
-            <a:schemeClr val="accent1"/>
-          </a:lnRef>
-          <a:fillRef idx="3">
-            <a:schemeClr val="accent1"/>
-          </a:fillRef>
-          <a:effectRef idx="2">
-            <a:schemeClr val="accent1"/>
-          </a:effectRef>
-          <a:fontRef idx="minor">
-            <a:schemeClr val="lt1"/>
-          </a:fontRef>
-        </p:style>
-        <p:txBody>
-          <a:bodyPr rtlCol="0" anchor="ctr"/>
-          <a:lstStyle/>
-          <a:p>
-            <a:pPr algn="ctr"/>
-            <a:endParaRPr lang="en-US"/>
-          </a:p>
-        </p:txBody>
-      </p:sp>
-      <p:sp>
-        <p:nvSpPr>
-          <p:cNvPr id="45" name="Rectangle 44">
-            <a:extLst>
-              <a:ext uri="{FF2B5EF4-FFF2-40B4-BE49-F238E27FC236}">
-                <a16:creationId xmlns:a16="http://schemas.microsoft.com/office/drawing/2014/main" id="{B313AB21-4E47-440D-B7F6-0D4A8496810F}"/>
-              </a:ext>
-            </a:extLst>
-          </p:cNvPr>
-          <p:cNvSpPr/>
-          <p:nvPr/>
-        </p:nvSpPr>
         <p:spPr bwMode="auto">
           <a:xfrm>
-            <a:off x="6158704" y="2321754"/>
-            <a:ext cx="3134420" cy="2738007"/>
+            <a:off x="6158703" y="2323035"/>
+            <a:ext cx="3134421" cy="2744181"/>
           </a:xfrm>
           <a:prstGeom prst="rect">
             <a:avLst/>
@@ -5117,8 +4902,10 @@
               <a:lumMod val="95000"/>
             </a:schemeClr>
           </a:solidFill>
-          <a:ln w="19050">
-            <a:noFill/>
+          <a:ln w="25400">
+            <a:solidFill>
+              <a:schemeClr val="tx1"/>
+            </a:solidFill>
           </a:ln>
         </p:spPr>
         <p:style>
@@ -5150,107 +4937,10 @@
       </p:sp>
       <p:sp>
         <p:nvSpPr>
-          <p:cNvPr id="46" name="TextBox 45">
+          <p:cNvPr id="53" name="Rounded Rectangle 70">
             <a:extLst>
               <a:ext uri="{FF2B5EF4-FFF2-40B4-BE49-F238E27FC236}">
-                <a16:creationId xmlns:a16="http://schemas.microsoft.com/office/drawing/2014/main" id="{158F742B-8944-4D5D-BDEB-A49CA2422130}"/>
-              </a:ext>
-            </a:extLst>
-          </p:cNvPr>
-          <p:cNvSpPr txBox="1"/>
-          <p:nvPr/>
-        </p:nvSpPr>
-        <p:spPr bwMode="auto">
-          <a:xfrm>
-            <a:off x="6384195" y="2934872"/>
-            <a:ext cx="1641380" cy="461665"/>
-          </a:xfrm>
-          <a:prstGeom prst="rect">
-            <a:avLst/>
-          </a:prstGeom>
-          <a:solidFill>
-            <a:schemeClr val="bg1">
-              <a:lumMod val="85000"/>
-            </a:schemeClr>
-          </a:solidFill>
-          <a:ln>
-            <a:noFill/>
-          </a:ln>
-        </p:spPr>
-        <p:txBody>
-          <a:bodyPr wrap="square" rIns="144000">
-            <a:spAutoFit/>
-          </a:bodyPr>
-          <a:lstStyle/>
-          <a:p>
-            <a:pPr algn="ctr">
-              <a:defRPr/>
-            </a:pPr>
-            <a:r>
-              <a:rPr lang="en-GB" sz="1200" b="1" dirty="0">
-                <a:latin typeface="+mn-lt"/>
-              </a:rPr>
-              <a:t>Master Output  Slave Input (MOSI)</a:t>
-            </a:r>
-          </a:p>
-        </p:txBody>
-      </p:sp>
-      <p:sp>
-        <p:nvSpPr>
-          <p:cNvPr id="47" name="TextBox 46">
-            <a:extLst>
-              <a:ext uri="{FF2B5EF4-FFF2-40B4-BE49-F238E27FC236}">
-                <a16:creationId xmlns:a16="http://schemas.microsoft.com/office/drawing/2014/main" id="{724F6ACF-C3A2-47D4-B2E5-D455322621AC}"/>
-              </a:ext>
-            </a:extLst>
-          </p:cNvPr>
-          <p:cNvSpPr txBox="1"/>
-          <p:nvPr/>
-        </p:nvSpPr>
-        <p:spPr bwMode="auto">
-          <a:xfrm>
-            <a:off x="6380004" y="2549521"/>
-            <a:ext cx="1641380" cy="288000"/>
-          </a:xfrm>
-          <a:prstGeom prst="rect">
-            <a:avLst/>
-          </a:prstGeom>
-          <a:solidFill>
-            <a:schemeClr val="bg1">
-              <a:lumMod val="85000"/>
-            </a:schemeClr>
-          </a:solidFill>
-          <a:ln>
-            <a:noFill/>
-          </a:ln>
-        </p:spPr>
-        <p:txBody>
-          <a:bodyPr wrap="square" rIns="144000">
-            <a:spAutoFit/>
-          </a:bodyPr>
-          <a:lstStyle/>
-          <a:p>
-            <a:pPr algn="ctr">
-              <a:defRPr/>
-            </a:pPr>
-            <a:r>
-              <a:rPr lang="en-US" sz="1200" b="1" dirty="0">
-                <a:latin typeface="+mn-lt"/>
-              </a:rPr>
-              <a:t>SPI Clock (SCK)</a:t>
-            </a:r>
-            <a:endParaRPr lang="en-GB" sz="1200" b="1" dirty="0">
-              <a:latin typeface="+mn-lt"/>
-            </a:endParaRPr>
-          </a:p>
-        </p:txBody>
-      </p:sp>
-      <p:sp>
-        <p:nvSpPr>
-          <p:cNvPr id="48" name="Rounded Rectangle 70">
-            <a:extLst>
-              <a:ext uri="{FF2B5EF4-FFF2-40B4-BE49-F238E27FC236}">
-                <a16:creationId xmlns:a16="http://schemas.microsoft.com/office/drawing/2014/main" id="{5AE1F956-08BD-4BAE-B389-7EA01DC9E2AE}"/>
+                <a16:creationId xmlns:a16="http://schemas.microsoft.com/office/drawing/2014/main" id="{D8F75C2F-E994-4298-B7E3-6326E6C87F54}"/>
               </a:ext>
             </a:extLst>
           </p:cNvPr>
@@ -5259,8 +4949,8 @@
         </p:nvSpPr>
         <p:spPr bwMode="auto">
           <a:xfrm>
-            <a:off x="5881279" y="1880911"/>
-            <a:ext cx="3689267" cy="433388"/>
+            <a:off x="7907753" y="2452809"/>
+            <a:ext cx="1800225" cy="433388"/>
           </a:xfrm>
           <a:prstGeom prst="roundRect">
             <a:avLst/>
@@ -5294,275 +4984,6 @@
               <a:defRPr/>
             </a:pPr>
             <a:r>
-              <a:rPr lang="en-US" sz="1600" b="1">
-                <a:solidFill>
-                  <a:schemeClr val="tx1"/>
-                </a:solidFill>
-                <a:latin typeface="Gill Sans MT" pitchFamily="34" charset="0"/>
-                <a:cs typeface="Courier New" pitchFamily="49" charset="0"/>
-              </a:rPr>
-              <a:t>SPI Server</a:t>
-            </a:r>
-            <a:endParaRPr lang="en-GB" sz="1600" b="1" dirty="0">
-              <a:solidFill>
-                <a:schemeClr val="tx1"/>
-              </a:solidFill>
-              <a:latin typeface="Gill Sans MT" pitchFamily="34" charset="0"/>
-              <a:cs typeface="Courier New" pitchFamily="49" charset="0"/>
-            </a:endParaRPr>
-          </a:p>
-        </p:txBody>
-      </p:sp>
-      <p:sp>
-        <p:nvSpPr>
-          <p:cNvPr id="49" name="Rectangle 48">
-            <a:extLst>
-              <a:ext uri="{FF2B5EF4-FFF2-40B4-BE49-F238E27FC236}">
-                <a16:creationId xmlns:a16="http://schemas.microsoft.com/office/drawing/2014/main" id="{8C9CD88D-87F3-4594-A8CC-3B11F5888DC0}"/>
-              </a:ext>
-            </a:extLst>
-          </p:cNvPr>
-          <p:cNvSpPr/>
-          <p:nvPr/>
-        </p:nvSpPr>
-        <p:spPr bwMode="auto">
-          <a:xfrm>
-            <a:off x="6158703" y="2323035"/>
-            <a:ext cx="3134421" cy="2744181"/>
-          </a:xfrm>
-          <a:prstGeom prst="rect">
-            <a:avLst/>
-          </a:prstGeom>
-          <a:noFill/>
-          <a:ln w="19050">
-            <a:solidFill>
-              <a:schemeClr val="tx1"/>
-            </a:solidFill>
-          </a:ln>
-        </p:spPr>
-        <p:style>
-          <a:lnRef idx="2">
-            <a:schemeClr val="accent1">
-              <a:shade val="50000"/>
-            </a:schemeClr>
-          </a:lnRef>
-          <a:fillRef idx="1">
-            <a:schemeClr val="accent1"/>
-          </a:fillRef>
-          <a:effectRef idx="0">
-            <a:schemeClr val="accent1"/>
-          </a:effectRef>
-          <a:fontRef idx="minor">
-            <a:schemeClr val="lt1"/>
-          </a:fontRef>
-        </p:style>
-        <p:txBody>
-          <a:bodyPr anchor="ctr"/>
-          <a:lstStyle/>
-          <a:p>
-            <a:pPr algn="r">
-              <a:defRPr/>
-            </a:pPr>
-            <a:endParaRPr lang="en-GB" dirty="0"/>
-          </a:p>
-        </p:txBody>
-      </p:sp>
-      <p:sp>
-        <p:nvSpPr>
-          <p:cNvPr id="50" name="TextBox 49">
-            <a:extLst>
-              <a:ext uri="{FF2B5EF4-FFF2-40B4-BE49-F238E27FC236}">
-                <a16:creationId xmlns:a16="http://schemas.microsoft.com/office/drawing/2014/main" id="{A02DF2B7-1EA5-43A0-804C-97399D6C6669}"/>
-              </a:ext>
-            </a:extLst>
-          </p:cNvPr>
-          <p:cNvSpPr txBox="1"/>
-          <p:nvPr/>
-        </p:nvSpPr>
-        <p:spPr bwMode="auto">
-          <a:xfrm>
-            <a:off x="6380005" y="3469874"/>
-            <a:ext cx="1641380" cy="461665"/>
-          </a:xfrm>
-          <a:prstGeom prst="rect">
-            <a:avLst/>
-          </a:prstGeom>
-          <a:solidFill>
-            <a:schemeClr val="bg1">
-              <a:lumMod val="85000"/>
-            </a:schemeClr>
-          </a:solidFill>
-          <a:ln>
-            <a:noFill/>
-          </a:ln>
-        </p:spPr>
-        <p:txBody>
-          <a:bodyPr wrap="square" rIns="144000">
-            <a:spAutoFit/>
-          </a:bodyPr>
-          <a:lstStyle/>
-          <a:p>
-            <a:pPr algn="ctr">
-              <a:defRPr/>
-            </a:pPr>
-            <a:r>
-              <a:rPr lang="en-GB" sz="1200" b="1" dirty="0">
-                <a:latin typeface="+mn-lt"/>
-              </a:rPr>
-              <a:t>Master Input  Slave Output (MISO)</a:t>
-            </a:r>
-          </a:p>
-        </p:txBody>
-      </p:sp>
-      <p:sp>
-        <p:nvSpPr>
-          <p:cNvPr id="51" name="TextBox 50">
-            <a:extLst>
-              <a:ext uri="{FF2B5EF4-FFF2-40B4-BE49-F238E27FC236}">
-                <a16:creationId xmlns:a16="http://schemas.microsoft.com/office/drawing/2014/main" id="{AB9D1D9B-DEA3-413E-BB2D-C9DA849D7D8B}"/>
-              </a:ext>
-            </a:extLst>
-          </p:cNvPr>
-          <p:cNvSpPr txBox="1"/>
-          <p:nvPr/>
-        </p:nvSpPr>
-        <p:spPr bwMode="auto">
-          <a:xfrm>
-            <a:off x="6380005" y="4004876"/>
-            <a:ext cx="1641379" cy="288000"/>
-          </a:xfrm>
-          <a:prstGeom prst="rect">
-            <a:avLst/>
-          </a:prstGeom>
-          <a:solidFill>
-            <a:schemeClr val="bg1">
-              <a:lumMod val="85000"/>
-            </a:schemeClr>
-          </a:solidFill>
-          <a:ln>
-            <a:noFill/>
-          </a:ln>
-        </p:spPr>
-        <p:txBody>
-          <a:bodyPr wrap="square" rIns="144000">
-            <a:spAutoFit/>
-          </a:bodyPr>
-          <a:lstStyle/>
-          <a:p>
-            <a:pPr algn="ctr">
-              <a:defRPr/>
-            </a:pPr>
-            <a:r>
-              <a:rPr lang="en-US" sz="1200" b="1" dirty="0">
-                <a:latin typeface="+mn-lt"/>
-              </a:rPr>
-              <a:t>Slave Select (SS)</a:t>
-            </a:r>
-            <a:endParaRPr lang="en-GB" sz="1200" b="1" dirty="0">
-              <a:latin typeface="+mn-lt"/>
-            </a:endParaRPr>
-          </a:p>
-        </p:txBody>
-      </p:sp>
-      <p:sp>
-        <p:nvSpPr>
-          <p:cNvPr id="52" name="TextBox 51">
-            <a:extLst>
-              <a:ext uri="{FF2B5EF4-FFF2-40B4-BE49-F238E27FC236}">
-                <a16:creationId xmlns:a16="http://schemas.microsoft.com/office/drawing/2014/main" id="{FBE7DA94-C6A8-4CB9-85D5-9E4C2D52BD62}"/>
-              </a:ext>
-            </a:extLst>
-          </p:cNvPr>
-          <p:cNvSpPr txBox="1"/>
-          <p:nvPr/>
-        </p:nvSpPr>
-        <p:spPr bwMode="auto">
-          <a:xfrm>
-            <a:off x="6380004" y="4627721"/>
-            <a:ext cx="1641380" cy="288000"/>
-          </a:xfrm>
-          <a:prstGeom prst="rect">
-            <a:avLst/>
-          </a:prstGeom>
-          <a:solidFill>
-            <a:schemeClr val="bg1">
-              <a:lumMod val="85000"/>
-            </a:schemeClr>
-          </a:solidFill>
-          <a:ln>
-            <a:noFill/>
-          </a:ln>
-        </p:spPr>
-        <p:txBody>
-          <a:bodyPr wrap="square" rIns="144000">
-            <a:spAutoFit/>
-          </a:bodyPr>
-          <a:lstStyle/>
-          <a:p>
-            <a:pPr algn="ctr">
-              <a:defRPr/>
-            </a:pPr>
-            <a:r>
-              <a:rPr lang="en-US" sz="1200" b="1" dirty="0">
-                <a:latin typeface="+mn-lt"/>
-              </a:rPr>
-              <a:t>Ground (GND)</a:t>
-            </a:r>
-            <a:endParaRPr lang="en-GB" sz="1200" b="1" dirty="0">
-              <a:latin typeface="+mn-lt"/>
-            </a:endParaRPr>
-          </a:p>
-        </p:txBody>
-      </p:sp>
-      <p:sp>
-        <p:nvSpPr>
-          <p:cNvPr id="53" name="Rounded Rectangle 70">
-            <a:extLst>
-              <a:ext uri="{FF2B5EF4-FFF2-40B4-BE49-F238E27FC236}">
-                <a16:creationId xmlns:a16="http://schemas.microsoft.com/office/drawing/2014/main" id="{D8F75C2F-E994-4298-B7E3-6326E6C87F54}"/>
-              </a:ext>
-            </a:extLst>
-          </p:cNvPr>
-          <p:cNvSpPr/>
-          <p:nvPr/>
-        </p:nvSpPr>
-        <p:spPr bwMode="auto">
-          <a:xfrm>
-            <a:off x="7635278" y="2510193"/>
-            <a:ext cx="1800225" cy="433388"/>
-          </a:xfrm>
-          <a:prstGeom prst="roundRect">
-            <a:avLst/>
-          </a:prstGeom>
-          <a:noFill/>
-          <a:ln w="12700">
-            <a:noFill/>
-          </a:ln>
-        </p:spPr>
-        <p:style>
-          <a:lnRef idx="2">
-            <a:schemeClr val="accent1">
-              <a:shade val="50000"/>
-            </a:schemeClr>
-          </a:lnRef>
-          <a:fillRef idx="1">
-            <a:schemeClr val="accent1"/>
-          </a:fillRef>
-          <a:effectRef idx="0">
-            <a:schemeClr val="accent1"/>
-          </a:effectRef>
-          <a:fontRef idx="minor">
-            <a:schemeClr val="lt1"/>
-          </a:fontRef>
-        </p:style>
-        <p:txBody>
-          <a:bodyPr anchor="ctr"/>
-          <a:lstStyle/>
-          <a:p>
-            <a:pPr algn="ctr">
-              <a:defRPr/>
-            </a:pPr>
-            <a:r>
               <a:rPr lang="en-US" sz="3200" b="1" dirty="0">
                 <a:solidFill>
                   <a:schemeClr val="tx1"/>
@@ -5579,57 +5000,6 @@
               <a:latin typeface="Gill Sans MT" pitchFamily="34" charset="0"/>
               <a:cs typeface="Courier New" pitchFamily="49" charset="0"/>
             </a:endParaRPr>
-          </a:p>
-        </p:txBody>
-      </p:sp>
-      <p:sp>
-        <p:nvSpPr>
-          <p:cNvPr id="54" name="Rectangle 53">
-            <a:extLst>
-              <a:ext uri="{FF2B5EF4-FFF2-40B4-BE49-F238E27FC236}">
-                <a16:creationId xmlns:a16="http://schemas.microsoft.com/office/drawing/2014/main" id="{067DFCB9-7497-4177-B91C-257DFEB03945}"/>
-              </a:ext>
-            </a:extLst>
-          </p:cNvPr>
-          <p:cNvSpPr/>
-          <p:nvPr/>
-        </p:nvSpPr>
-        <p:spPr>
-          <a:xfrm>
-            <a:off x="6273801" y="2490374"/>
-            <a:ext cx="2745762" cy="1907400"/>
-          </a:xfrm>
-          <a:prstGeom prst="rect">
-            <a:avLst/>
-          </a:prstGeom>
-          <a:noFill/>
-          <a:ln>
-            <a:solidFill>
-              <a:schemeClr val="accent1"/>
-            </a:solidFill>
-          </a:ln>
-          <a:effectLst/>
-        </p:spPr>
-        <p:style>
-          <a:lnRef idx="1">
-            <a:schemeClr val="accent1"/>
-          </a:lnRef>
-          <a:fillRef idx="3">
-            <a:schemeClr val="accent1"/>
-          </a:fillRef>
-          <a:effectRef idx="2">
-            <a:schemeClr val="accent1"/>
-          </a:effectRef>
-          <a:fontRef idx="minor">
-            <a:schemeClr val="lt1"/>
-          </a:fontRef>
-        </p:style>
-        <p:txBody>
-          <a:bodyPr rtlCol="0" anchor="ctr"/>
-          <a:lstStyle/>
-          <a:p>
-            <a:pPr algn="ctr"/>
-            <a:endParaRPr lang="en-US"/>
           </a:p>
         </p:txBody>
       </p:sp>
@@ -5652,14 +5022,14 @@
         <p:spPr>
           <a:xfrm>
             <a:off x="4218245" y="2693521"/>
-            <a:ext cx="2161759" cy="0"/>
+            <a:ext cx="2161759" cy="5949"/>
           </a:xfrm>
           <a:prstGeom prst="straightConnector1">
             <a:avLst/>
           </a:prstGeom>
           <a:ln>
-            <a:headEnd type="triangle"/>
-            <a:tailEnd type="triangle"/>
+            <a:headEnd type="none"/>
+            <a:tailEnd type="none"/>
           </a:ln>
         </p:spPr>
         <p:style>
@@ -5695,15 +5065,15 @@
         </p:nvCxnSpPr>
         <p:spPr>
           <a:xfrm>
-            <a:off x="4222436" y="3165705"/>
-            <a:ext cx="2161759" cy="0"/>
+            <a:off x="4218245" y="3165705"/>
+            <a:ext cx="2165949" cy="0"/>
           </a:xfrm>
           <a:prstGeom prst="straightConnector1">
             <a:avLst/>
           </a:prstGeom>
           <a:ln>
-            <a:headEnd type="triangle"/>
-            <a:tailEnd type="triangle"/>
+            <a:headEnd type="none"/>
+            <a:tailEnd type="none"/>
           </a:ln>
         </p:spPr>
         <p:style>
@@ -5744,8 +5114,8 @@
             <a:avLst/>
           </a:prstGeom>
           <a:ln>
-            <a:headEnd type="triangle"/>
-            <a:tailEnd type="triangle"/>
+            <a:headEnd type="none"/>
+            <a:tailEnd type="none"/>
           </a:ln>
         </p:spPr>
         <p:style>
@@ -5780,16 +5150,16 @@
           <p:nvPr/>
         </p:nvCxnSpPr>
         <p:spPr>
-          <a:xfrm>
+          <a:xfrm flipV="1">
             <a:off x="4218245" y="4148876"/>
-            <a:ext cx="2161760" cy="0"/>
+            <a:ext cx="2165949" cy="9571"/>
           </a:xfrm>
           <a:prstGeom prst="straightConnector1">
             <a:avLst/>
           </a:prstGeom>
           <a:ln>
-            <a:headEnd type="triangle"/>
-            <a:tailEnd type="triangle"/>
+            <a:headEnd type="none"/>
+            <a:tailEnd type="none"/>
           </a:ln>
         </p:spPr>
         <p:style>
@@ -5825,15 +5195,15 @@
         </p:nvCxnSpPr>
         <p:spPr>
           <a:xfrm>
-            <a:off x="4218245" y="4771721"/>
-            <a:ext cx="2161759" cy="0"/>
+            <a:off x="4218245" y="4763928"/>
+            <a:ext cx="2161759" cy="7793"/>
           </a:xfrm>
           <a:prstGeom prst="straightConnector1">
             <a:avLst/>
           </a:prstGeom>
           <a:ln>
-            <a:headEnd type="triangle"/>
-            <a:tailEnd type="triangle"/>
+            <a:headEnd type="none"/>
+            <a:tailEnd type="none"/>
           </a:ln>
         </p:spPr>
         <p:style>
@@ -5851,6 +5221,616 @@
           </a:fontRef>
         </p:style>
       </p:cxnSp>
+      <p:sp>
+        <p:nvSpPr>
+          <p:cNvPr id="29" name="TextBox 28">
+            <a:extLst>
+              <a:ext uri="{FF2B5EF4-FFF2-40B4-BE49-F238E27FC236}">
+                <a16:creationId xmlns:a16="http://schemas.microsoft.com/office/drawing/2014/main" id="{26428358-90C4-4CAA-B022-EF9478171E1A}"/>
+              </a:ext>
+            </a:extLst>
+          </p:cNvPr>
+          <p:cNvSpPr txBox="1"/>
+          <p:nvPr/>
+        </p:nvSpPr>
+        <p:spPr bwMode="auto">
+          <a:xfrm>
+            <a:off x="2576865" y="2934872"/>
+            <a:ext cx="1641380" cy="461665"/>
+          </a:xfrm>
+          <a:prstGeom prst="rect">
+            <a:avLst/>
+          </a:prstGeom>
+          <a:solidFill>
+            <a:schemeClr val="bg1">
+              <a:lumMod val="85000"/>
+            </a:schemeClr>
+          </a:solidFill>
+          <a:ln w="19050">
+            <a:solidFill>
+              <a:schemeClr val="accent1"/>
+            </a:solidFill>
+          </a:ln>
+        </p:spPr>
+        <p:txBody>
+          <a:bodyPr wrap="square" rIns="144000">
+            <a:spAutoFit/>
+          </a:bodyPr>
+          <a:lstStyle/>
+          <a:p>
+            <a:pPr algn="ctr">
+              <a:defRPr/>
+            </a:pPr>
+            <a:r>
+              <a:rPr lang="en-GB" sz="1200" b="1" dirty="0">
+                <a:latin typeface="+mn-lt"/>
+              </a:rPr>
+              <a:t>Master Output  Slave Input (MOSI)</a:t>
+            </a:r>
+          </a:p>
+        </p:txBody>
+      </p:sp>
+      <p:sp>
+        <p:nvSpPr>
+          <p:cNvPr id="34" name="TextBox 33">
+            <a:extLst>
+              <a:ext uri="{FF2B5EF4-FFF2-40B4-BE49-F238E27FC236}">
+                <a16:creationId xmlns:a16="http://schemas.microsoft.com/office/drawing/2014/main" id="{89A48D16-2712-41B9-A4F8-89C36054F730}"/>
+              </a:ext>
+            </a:extLst>
+          </p:cNvPr>
+          <p:cNvSpPr txBox="1"/>
+          <p:nvPr/>
+        </p:nvSpPr>
+        <p:spPr bwMode="auto">
+          <a:xfrm>
+            <a:off x="2576865" y="2549521"/>
+            <a:ext cx="1641380" cy="288000"/>
+          </a:xfrm>
+          <a:prstGeom prst="rect">
+            <a:avLst/>
+          </a:prstGeom>
+          <a:solidFill>
+            <a:schemeClr val="bg1">
+              <a:lumMod val="85000"/>
+            </a:schemeClr>
+          </a:solidFill>
+          <a:ln w="19050">
+            <a:solidFill>
+              <a:schemeClr val="accent1"/>
+            </a:solidFill>
+          </a:ln>
+        </p:spPr>
+        <p:txBody>
+          <a:bodyPr wrap="square" rIns="144000">
+            <a:spAutoFit/>
+          </a:bodyPr>
+          <a:lstStyle/>
+          <a:p>
+            <a:pPr algn="ctr">
+              <a:defRPr/>
+            </a:pPr>
+            <a:r>
+              <a:rPr lang="en-US" sz="1200" b="1" dirty="0">
+                <a:latin typeface="+mn-lt"/>
+              </a:rPr>
+              <a:t>SPI Clock (SCK)</a:t>
+            </a:r>
+            <a:endParaRPr lang="en-GB" sz="1200" b="1" dirty="0">
+              <a:latin typeface="+mn-lt"/>
+            </a:endParaRPr>
+          </a:p>
+        </p:txBody>
+      </p:sp>
+      <p:sp>
+        <p:nvSpPr>
+          <p:cNvPr id="37" name="TextBox 36">
+            <a:extLst>
+              <a:ext uri="{FF2B5EF4-FFF2-40B4-BE49-F238E27FC236}">
+                <a16:creationId xmlns:a16="http://schemas.microsoft.com/office/drawing/2014/main" id="{01701BDF-CF48-4C90-8EE1-9A5C98BACD5A}"/>
+              </a:ext>
+            </a:extLst>
+          </p:cNvPr>
+          <p:cNvSpPr txBox="1"/>
+          <p:nvPr/>
+        </p:nvSpPr>
+        <p:spPr bwMode="auto">
+          <a:xfrm>
+            <a:off x="2576865" y="3478549"/>
+            <a:ext cx="1641380" cy="461665"/>
+          </a:xfrm>
+          <a:prstGeom prst="rect">
+            <a:avLst/>
+          </a:prstGeom>
+          <a:solidFill>
+            <a:schemeClr val="bg1">
+              <a:lumMod val="85000"/>
+            </a:schemeClr>
+          </a:solidFill>
+          <a:ln w="19050">
+            <a:solidFill>
+              <a:schemeClr val="accent1"/>
+            </a:solidFill>
+          </a:ln>
+        </p:spPr>
+        <p:txBody>
+          <a:bodyPr wrap="square" rIns="144000">
+            <a:spAutoFit/>
+          </a:bodyPr>
+          <a:lstStyle/>
+          <a:p>
+            <a:pPr algn="ctr">
+              <a:defRPr/>
+            </a:pPr>
+            <a:r>
+              <a:rPr lang="en-GB" sz="1200" b="1" dirty="0">
+                <a:latin typeface="+mn-lt"/>
+              </a:rPr>
+              <a:t>Master Input  Slave Output (MISO)</a:t>
+            </a:r>
+          </a:p>
+        </p:txBody>
+      </p:sp>
+      <p:sp>
+        <p:nvSpPr>
+          <p:cNvPr id="38" name="TextBox 37">
+            <a:extLst>
+              <a:ext uri="{FF2B5EF4-FFF2-40B4-BE49-F238E27FC236}">
+                <a16:creationId xmlns:a16="http://schemas.microsoft.com/office/drawing/2014/main" id="{C33D8BEB-D38E-42BD-9053-CF3047346ADB}"/>
+              </a:ext>
+            </a:extLst>
+          </p:cNvPr>
+          <p:cNvSpPr txBox="1"/>
+          <p:nvPr/>
+        </p:nvSpPr>
+        <p:spPr bwMode="auto">
+          <a:xfrm>
+            <a:off x="2576866" y="4014447"/>
+            <a:ext cx="1641379" cy="288000"/>
+          </a:xfrm>
+          <a:prstGeom prst="rect">
+            <a:avLst/>
+          </a:prstGeom>
+          <a:solidFill>
+            <a:schemeClr val="bg1">
+              <a:lumMod val="85000"/>
+            </a:schemeClr>
+          </a:solidFill>
+          <a:ln w="19050">
+            <a:solidFill>
+              <a:schemeClr val="accent1"/>
+            </a:solidFill>
+          </a:ln>
+        </p:spPr>
+        <p:txBody>
+          <a:bodyPr wrap="square" rIns="144000">
+            <a:spAutoFit/>
+          </a:bodyPr>
+          <a:lstStyle/>
+          <a:p>
+            <a:pPr algn="ctr">
+              <a:defRPr/>
+            </a:pPr>
+            <a:r>
+              <a:rPr lang="en-US" sz="1200" b="1" dirty="0">
+                <a:latin typeface="+mn-lt"/>
+              </a:rPr>
+              <a:t>Slave Select (SS)</a:t>
+            </a:r>
+            <a:endParaRPr lang="en-GB" sz="1200" b="1" dirty="0">
+              <a:latin typeface="+mn-lt"/>
+            </a:endParaRPr>
+          </a:p>
+        </p:txBody>
+      </p:sp>
+      <p:sp>
+        <p:nvSpPr>
+          <p:cNvPr id="39" name="TextBox 38">
+            <a:extLst>
+              <a:ext uri="{FF2B5EF4-FFF2-40B4-BE49-F238E27FC236}">
+                <a16:creationId xmlns:a16="http://schemas.microsoft.com/office/drawing/2014/main" id="{13D7A0BD-F64F-425E-B650-D9F64065FE3E}"/>
+              </a:ext>
+            </a:extLst>
+          </p:cNvPr>
+          <p:cNvSpPr txBox="1"/>
+          <p:nvPr/>
+        </p:nvSpPr>
+        <p:spPr bwMode="auto">
+          <a:xfrm>
+            <a:off x="2576865" y="4619928"/>
+            <a:ext cx="1641380" cy="288000"/>
+          </a:xfrm>
+          <a:prstGeom prst="rect">
+            <a:avLst/>
+          </a:prstGeom>
+          <a:solidFill>
+            <a:schemeClr val="bg1">
+              <a:lumMod val="85000"/>
+            </a:schemeClr>
+          </a:solidFill>
+          <a:ln w="19050">
+            <a:solidFill>
+              <a:schemeClr val="accent1"/>
+            </a:solidFill>
+          </a:ln>
+        </p:spPr>
+        <p:txBody>
+          <a:bodyPr wrap="square" rIns="144000">
+            <a:spAutoFit/>
+          </a:bodyPr>
+          <a:lstStyle/>
+          <a:p>
+            <a:pPr algn="ctr">
+              <a:defRPr/>
+            </a:pPr>
+            <a:r>
+              <a:rPr lang="en-US" sz="1200" b="1" dirty="0">
+                <a:latin typeface="+mn-lt"/>
+              </a:rPr>
+              <a:t>Ground (GND)</a:t>
+            </a:r>
+            <a:endParaRPr lang="en-GB" sz="1200" b="1" dirty="0">
+              <a:latin typeface="+mn-lt"/>
+            </a:endParaRPr>
+          </a:p>
+        </p:txBody>
+      </p:sp>
+      <p:sp>
+        <p:nvSpPr>
+          <p:cNvPr id="41" name="Rectangle 40">
+            <a:extLst>
+              <a:ext uri="{FF2B5EF4-FFF2-40B4-BE49-F238E27FC236}">
+                <a16:creationId xmlns:a16="http://schemas.microsoft.com/office/drawing/2014/main" id="{F52EF456-4449-4137-9384-BE71C55D7EDB}"/>
+              </a:ext>
+            </a:extLst>
+          </p:cNvPr>
+          <p:cNvSpPr/>
+          <p:nvPr/>
+        </p:nvSpPr>
+        <p:spPr>
+          <a:xfrm>
+            <a:off x="1414463" y="2445599"/>
+            <a:ext cx="2914651" cy="1952172"/>
+          </a:xfrm>
+          <a:prstGeom prst="rect">
+            <a:avLst/>
+          </a:prstGeom>
+          <a:noFill/>
+          <a:ln w="19050">
+            <a:solidFill>
+              <a:schemeClr val="accent1"/>
+            </a:solidFill>
+          </a:ln>
+          <a:effectLst/>
+        </p:spPr>
+        <p:style>
+          <a:lnRef idx="1">
+            <a:schemeClr val="accent1"/>
+          </a:lnRef>
+          <a:fillRef idx="3">
+            <a:schemeClr val="accent1"/>
+          </a:fillRef>
+          <a:effectRef idx="2">
+            <a:schemeClr val="accent1"/>
+          </a:effectRef>
+          <a:fontRef idx="minor">
+            <a:schemeClr val="lt1"/>
+          </a:fontRef>
+        </p:style>
+        <p:txBody>
+          <a:bodyPr rtlCol="0" anchor="ctr"/>
+          <a:lstStyle/>
+          <a:p>
+            <a:pPr algn="ctr"/>
+            <a:endParaRPr lang="en-US"/>
+          </a:p>
+        </p:txBody>
+      </p:sp>
+      <p:sp>
+        <p:nvSpPr>
+          <p:cNvPr id="46" name="TextBox 45">
+            <a:extLst>
+              <a:ext uri="{FF2B5EF4-FFF2-40B4-BE49-F238E27FC236}">
+                <a16:creationId xmlns:a16="http://schemas.microsoft.com/office/drawing/2014/main" id="{158F742B-8944-4D5D-BDEB-A49CA2422130}"/>
+              </a:ext>
+            </a:extLst>
+          </p:cNvPr>
+          <p:cNvSpPr txBox="1"/>
+          <p:nvPr/>
+        </p:nvSpPr>
+        <p:spPr bwMode="auto">
+          <a:xfrm>
+            <a:off x="6384194" y="2934872"/>
+            <a:ext cx="1637189" cy="461665"/>
+          </a:xfrm>
+          <a:prstGeom prst="rect">
+            <a:avLst/>
+          </a:prstGeom>
+          <a:solidFill>
+            <a:schemeClr val="bg1">
+              <a:lumMod val="85000"/>
+            </a:schemeClr>
+          </a:solidFill>
+          <a:ln w="19050">
+            <a:solidFill>
+              <a:schemeClr val="accent1"/>
+            </a:solidFill>
+          </a:ln>
+        </p:spPr>
+        <p:txBody>
+          <a:bodyPr wrap="square" rIns="144000">
+            <a:spAutoFit/>
+          </a:bodyPr>
+          <a:lstStyle/>
+          <a:p>
+            <a:pPr algn="ctr">
+              <a:defRPr/>
+            </a:pPr>
+            <a:r>
+              <a:rPr lang="en-GB" sz="1200" b="1" dirty="0">
+                <a:latin typeface="+mn-lt"/>
+              </a:rPr>
+              <a:t>Master Output  Slave Input (MOSI)</a:t>
+            </a:r>
+          </a:p>
+        </p:txBody>
+      </p:sp>
+      <p:sp>
+        <p:nvSpPr>
+          <p:cNvPr id="47" name="TextBox 46">
+            <a:extLst>
+              <a:ext uri="{FF2B5EF4-FFF2-40B4-BE49-F238E27FC236}">
+                <a16:creationId xmlns:a16="http://schemas.microsoft.com/office/drawing/2014/main" id="{724F6ACF-C3A2-47D4-B2E5-D455322621AC}"/>
+              </a:ext>
+            </a:extLst>
+          </p:cNvPr>
+          <p:cNvSpPr txBox="1"/>
+          <p:nvPr/>
+        </p:nvSpPr>
+        <p:spPr bwMode="auto">
+          <a:xfrm>
+            <a:off x="6380004" y="2555470"/>
+            <a:ext cx="1641380" cy="288000"/>
+          </a:xfrm>
+          <a:prstGeom prst="rect">
+            <a:avLst/>
+          </a:prstGeom>
+          <a:solidFill>
+            <a:schemeClr val="bg1">
+              <a:lumMod val="85000"/>
+            </a:schemeClr>
+          </a:solidFill>
+          <a:ln w="19050">
+            <a:solidFill>
+              <a:schemeClr val="accent1"/>
+            </a:solidFill>
+          </a:ln>
+        </p:spPr>
+        <p:txBody>
+          <a:bodyPr wrap="square" rIns="144000">
+            <a:spAutoFit/>
+          </a:bodyPr>
+          <a:lstStyle/>
+          <a:p>
+            <a:pPr algn="ctr">
+              <a:defRPr/>
+            </a:pPr>
+            <a:r>
+              <a:rPr lang="en-US" sz="1200" b="1" dirty="0">
+                <a:latin typeface="+mn-lt"/>
+              </a:rPr>
+              <a:t>SPI Clock (SCK)</a:t>
+            </a:r>
+            <a:endParaRPr lang="en-GB" sz="1200" b="1" dirty="0">
+              <a:latin typeface="+mn-lt"/>
+            </a:endParaRPr>
+          </a:p>
+        </p:txBody>
+      </p:sp>
+      <p:sp>
+        <p:nvSpPr>
+          <p:cNvPr id="50" name="TextBox 49">
+            <a:extLst>
+              <a:ext uri="{FF2B5EF4-FFF2-40B4-BE49-F238E27FC236}">
+                <a16:creationId xmlns:a16="http://schemas.microsoft.com/office/drawing/2014/main" id="{A02DF2B7-1EA5-43A0-804C-97399D6C6669}"/>
+              </a:ext>
+            </a:extLst>
+          </p:cNvPr>
+          <p:cNvSpPr txBox="1"/>
+          <p:nvPr/>
+        </p:nvSpPr>
+        <p:spPr bwMode="auto">
+          <a:xfrm>
+            <a:off x="6380004" y="3476064"/>
+            <a:ext cx="1641380" cy="461665"/>
+          </a:xfrm>
+          <a:prstGeom prst="rect">
+            <a:avLst/>
+          </a:prstGeom>
+          <a:solidFill>
+            <a:schemeClr val="bg1">
+              <a:lumMod val="85000"/>
+            </a:schemeClr>
+          </a:solidFill>
+          <a:ln w="19050">
+            <a:solidFill>
+              <a:schemeClr val="accent1"/>
+            </a:solidFill>
+          </a:ln>
+        </p:spPr>
+        <p:txBody>
+          <a:bodyPr wrap="square" rIns="144000">
+            <a:spAutoFit/>
+          </a:bodyPr>
+          <a:lstStyle/>
+          <a:p>
+            <a:pPr algn="ctr">
+              <a:defRPr/>
+            </a:pPr>
+            <a:r>
+              <a:rPr lang="en-GB" sz="1200" b="1" dirty="0">
+                <a:latin typeface="+mn-lt"/>
+              </a:rPr>
+              <a:t>Master Input  Slave Output (MISO)</a:t>
+            </a:r>
+          </a:p>
+        </p:txBody>
+      </p:sp>
+      <p:sp>
+        <p:nvSpPr>
+          <p:cNvPr id="51" name="TextBox 50">
+            <a:extLst>
+              <a:ext uri="{FF2B5EF4-FFF2-40B4-BE49-F238E27FC236}">
+                <a16:creationId xmlns:a16="http://schemas.microsoft.com/office/drawing/2014/main" id="{AB9D1D9B-DEA3-413E-BB2D-C9DA849D7D8B}"/>
+              </a:ext>
+            </a:extLst>
+          </p:cNvPr>
+          <p:cNvSpPr txBox="1"/>
+          <p:nvPr/>
+        </p:nvSpPr>
+        <p:spPr bwMode="auto">
+          <a:xfrm>
+            <a:off x="6384194" y="4004876"/>
+            <a:ext cx="1637189" cy="288000"/>
+          </a:xfrm>
+          <a:prstGeom prst="rect">
+            <a:avLst/>
+          </a:prstGeom>
+          <a:solidFill>
+            <a:schemeClr val="bg1">
+              <a:lumMod val="85000"/>
+            </a:schemeClr>
+          </a:solidFill>
+          <a:ln w="19050">
+            <a:solidFill>
+              <a:schemeClr val="accent1"/>
+            </a:solidFill>
+          </a:ln>
+        </p:spPr>
+        <p:txBody>
+          <a:bodyPr wrap="square" rIns="144000">
+            <a:spAutoFit/>
+          </a:bodyPr>
+          <a:lstStyle/>
+          <a:p>
+            <a:pPr algn="ctr">
+              <a:defRPr/>
+            </a:pPr>
+            <a:r>
+              <a:rPr lang="en-US" sz="1200" b="1" dirty="0">
+                <a:latin typeface="+mn-lt"/>
+              </a:rPr>
+              <a:t>Slave Select (SS)</a:t>
+            </a:r>
+            <a:endParaRPr lang="en-GB" sz="1200" b="1" dirty="0">
+              <a:latin typeface="+mn-lt"/>
+            </a:endParaRPr>
+          </a:p>
+        </p:txBody>
+      </p:sp>
+      <p:sp>
+        <p:nvSpPr>
+          <p:cNvPr id="52" name="TextBox 51">
+            <a:extLst>
+              <a:ext uri="{FF2B5EF4-FFF2-40B4-BE49-F238E27FC236}">
+                <a16:creationId xmlns:a16="http://schemas.microsoft.com/office/drawing/2014/main" id="{FBE7DA94-C6A8-4CB9-85D5-9E4C2D52BD62}"/>
+              </a:ext>
+            </a:extLst>
+          </p:cNvPr>
+          <p:cNvSpPr txBox="1"/>
+          <p:nvPr/>
+        </p:nvSpPr>
+        <p:spPr bwMode="auto">
+          <a:xfrm>
+            <a:off x="6380004" y="4627721"/>
+            <a:ext cx="1641380" cy="288000"/>
+          </a:xfrm>
+          <a:prstGeom prst="rect">
+            <a:avLst/>
+          </a:prstGeom>
+          <a:solidFill>
+            <a:schemeClr val="bg1">
+              <a:lumMod val="85000"/>
+            </a:schemeClr>
+          </a:solidFill>
+          <a:ln w="19050">
+            <a:solidFill>
+              <a:schemeClr val="accent1"/>
+            </a:solidFill>
+          </a:ln>
+        </p:spPr>
+        <p:txBody>
+          <a:bodyPr wrap="square" rIns="144000">
+            <a:spAutoFit/>
+          </a:bodyPr>
+          <a:lstStyle/>
+          <a:p>
+            <a:pPr algn="ctr">
+              <a:defRPr/>
+            </a:pPr>
+            <a:r>
+              <a:rPr lang="en-US" sz="1200" b="1" dirty="0">
+                <a:latin typeface="+mn-lt"/>
+              </a:rPr>
+              <a:t>Ground (GND)</a:t>
+            </a:r>
+            <a:endParaRPr lang="en-GB" sz="1200" b="1" dirty="0">
+              <a:latin typeface="+mn-lt"/>
+            </a:endParaRPr>
+          </a:p>
+        </p:txBody>
+      </p:sp>
+      <p:sp>
+        <p:nvSpPr>
+          <p:cNvPr id="54" name="Rectangle 53">
+            <a:extLst>
+              <a:ext uri="{FF2B5EF4-FFF2-40B4-BE49-F238E27FC236}">
+                <a16:creationId xmlns:a16="http://schemas.microsoft.com/office/drawing/2014/main" id="{067DFCB9-7497-4177-B91C-257DFEB03945}"/>
+              </a:ext>
+            </a:extLst>
+          </p:cNvPr>
+          <p:cNvSpPr/>
+          <p:nvPr/>
+        </p:nvSpPr>
+        <p:spPr>
+          <a:xfrm>
+            <a:off x="6266587" y="2448811"/>
+            <a:ext cx="2925037" cy="1948953"/>
+          </a:xfrm>
+          <a:prstGeom prst="rect">
+            <a:avLst/>
+          </a:prstGeom>
+          <a:noFill/>
+          <a:ln w="19050">
+            <a:solidFill>
+              <a:schemeClr val="accent1"/>
+            </a:solidFill>
+          </a:ln>
+          <a:effectLst/>
+        </p:spPr>
+        <p:style>
+          <a:lnRef idx="1">
+            <a:schemeClr val="accent1"/>
+          </a:lnRef>
+          <a:fillRef idx="3">
+            <a:schemeClr val="accent1"/>
+          </a:fillRef>
+          <a:effectRef idx="2">
+            <a:schemeClr val="accent1"/>
+          </a:effectRef>
+          <a:fontRef idx="minor">
+            <a:schemeClr val="lt1"/>
+          </a:fontRef>
+        </p:style>
+        <p:txBody>
+          <a:bodyPr rtlCol="0" anchor="ctr"/>
+          <a:lstStyle/>
+          <a:p>
+            <a:pPr algn="ctr"/>
+            <a:endParaRPr lang="en-US"/>
+          </a:p>
+        </p:txBody>
+      </p:sp>
     </p:spTree>
     <p:extLst>
       <p:ext uri="{BB962C8B-B14F-4D97-AF65-F5344CB8AC3E}">

</xml_diff>

<commit_message>
Improved robustness of SPI testing and SPI Server
</commit_message>
<xml_diff>
--- a/Doxygen/images/src/SPI_pin_connection.pptx
+++ b/Doxygen/images/src/SPI_pin_connection.pptx
@@ -256,7 +256,7 @@
             <a:fld id="{E72D30EF-8F20-0B47-8B5D-39A8BC29E860}" type="datetimeFigureOut">
               <a:rPr lang="en-US" smtClean="0"/>
               <a:pPr/>
-              <a:t>7/6/2020</a:t>
+              <a:t>13-Apr-21</a:t>
             </a:fld>
             <a:endParaRPr lang="en-US"/>
           </a:p>
@@ -424,7 +424,7 @@
             <a:fld id="{77EDD36E-1E02-F241-9611-1F1D9EAAD326}" type="datetimeFigureOut">
               <a:rPr lang="en-US" smtClean="0"/>
               <a:pPr/>
-              <a:t>7/6/2020</a:t>
+              <a:t>13-Apr-21</a:t>
             </a:fld>
             <a:endParaRPr lang="en-US"/>
           </a:p>
@@ -5802,6 +5802,283 @@
           </a:prstGeom>
           <a:noFill/>
           <a:ln w="19050">
+            <a:solidFill>
+              <a:schemeClr val="accent1"/>
+            </a:solidFill>
+          </a:ln>
+          <a:effectLst/>
+        </p:spPr>
+        <p:style>
+          <a:lnRef idx="1">
+            <a:schemeClr val="accent1"/>
+          </a:lnRef>
+          <a:fillRef idx="3">
+            <a:schemeClr val="accent1"/>
+          </a:fillRef>
+          <a:effectRef idx="2">
+            <a:schemeClr val="accent1"/>
+          </a:effectRef>
+          <a:fontRef idx="minor">
+            <a:schemeClr val="lt1"/>
+          </a:fontRef>
+        </p:style>
+        <p:txBody>
+          <a:bodyPr rtlCol="0" anchor="ctr"/>
+          <a:lstStyle/>
+          <a:p>
+            <a:pPr algn="ctr"/>
+            <a:endParaRPr lang="en-US"/>
+          </a:p>
+        </p:txBody>
+      </p:sp>
+      <p:sp>
+        <p:nvSpPr>
+          <p:cNvPr id="2" name="Rectangle 1">
+            <a:extLst>
+              <a:ext uri="{FF2B5EF4-FFF2-40B4-BE49-F238E27FC236}">
+                <a16:creationId xmlns:a16="http://schemas.microsoft.com/office/drawing/2014/main" id="{58D0B274-5A41-4FBC-9D63-5A47E764ECD4}"/>
+              </a:ext>
+            </a:extLst>
+          </p:cNvPr>
+          <p:cNvSpPr/>
+          <p:nvPr/>
+        </p:nvSpPr>
+        <p:spPr>
+          <a:xfrm>
+            <a:off x="5057160" y="3885426"/>
+            <a:ext cx="78369" cy="201576"/>
+          </a:xfrm>
+          <a:prstGeom prst="rect">
+            <a:avLst/>
+          </a:prstGeom>
+          <a:noFill/>
+          <a:ln w="19050">
+            <a:solidFill>
+              <a:schemeClr val="accent1"/>
+            </a:solidFill>
+          </a:ln>
+          <a:effectLst/>
+        </p:spPr>
+        <p:style>
+          <a:lnRef idx="1">
+            <a:schemeClr val="accent1"/>
+          </a:lnRef>
+          <a:fillRef idx="3">
+            <a:schemeClr val="accent1"/>
+          </a:fillRef>
+          <a:effectRef idx="2">
+            <a:schemeClr val="accent1"/>
+          </a:effectRef>
+          <a:fontRef idx="minor">
+            <a:schemeClr val="lt1"/>
+          </a:fontRef>
+        </p:style>
+        <p:txBody>
+          <a:bodyPr rtlCol="0" anchor="ctr"/>
+          <a:lstStyle/>
+          <a:p>
+            <a:pPr algn="ctr"/>
+            <a:r>
+              <a:rPr lang="en-US" b="1"/>
+              <a:t> </a:t>
+            </a:r>
+          </a:p>
+        </p:txBody>
+      </p:sp>
+      <p:cxnSp>
+        <p:nvCxnSpPr>
+          <p:cNvPr id="8" name="Straight Connector 7">
+            <a:extLst>
+              <a:ext uri="{FF2B5EF4-FFF2-40B4-BE49-F238E27FC236}">
+                <a16:creationId xmlns:a16="http://schemas.microsoft.com/office/drawing/2014/main" id="{BCE7070C-31C8-4B8C-A0E9-B62E56FF3B20}"/>
+              </a:ext>
+            </a:extLst>
+          </p:cNvPr>
+          <p:cNvCxnSpPr>
+            <a:cxnSpLocks/>
+            <a:stCxn id="2" idx="2"/>
+          </p:cNvCxnSpPr>
+          <p:nvPr/>
+        </p:nvCxnSpPr>
+        <p:spPr>
+          <a:xfrm>
+            <a:off x="5096345" y="4087002"/>
+            <a:ext cx="0" cy="54731"/>
+          </a:xfrm>
+          <a:prstGeom prst="line">
+            <a:avLst/>
+          </a:prstGeom>
+          <a:ln w="19050">
+            <a:solidFill>
+              <a:schemeClr val="accent1"/>
+            </a:solidFill>
+          </a:ln>
+        </p:spPr>
+        <p:style>
+          <a:lnRef idx="1">
+            <a:schemeClr val="accent1"/>
+          </a:lnRef>
+          <a:fillRef idx="0">
+            <a:schemeClr val="accent1"/>
+          </a:fillRef>
+          <a:effectRef idx="0">
+            <a:schemeClr val="accent1"/>
+          </a:effectRef>
+          <a:fontRef idx="minor">
+            <a:schemeClr val="tx1"/>
+          </a:fontRef>
+        </p:style>
+      </p:cxnSp>
+      <p:cxnSp>
+        <p:nvCxnSpPr>
+          <p:cNvPr id="22" name="Straight Arrow Connector 21">
+            <a:extLst>
+              <a:ext uri="{FF2B5EF4-FFF2-40B4-BE49-F238E27FC236}">
+                <a16:creationId xmlns:a16="http://schemas.microsoft.com/office/drawing/2014/main" id="{9C0A7811-07F5-46FB-802B-59CF694D5E01}"/>
+              </a:ext>
+            </a:extLst>
+          </p:cNvPr>
+          <p:cNvCxnSpPr>
+            <a:cxnSpLocks/>
+            <a:stCxn id="2" idx="0"/>
+          </p:cNvCxnSpPr>
+          <p:nvPr/>
+        </p:nvCxnSpPr>
+        <p:spPr>
+          <a:xfrm flipV="1">
+            <a:off x="5096345" y="3763514"/>
+            <a:ext cx="0" cy="121912"/>
+          </a:xfrm>
+          <a:prstGeom prst="straightConnector1">
+            <a:avLst/>
+          </a:prstGeom>
+          <a:ln w="19050">
+            <a:solidFill>
+              <a:schemeClr val="accent1"/>
+            </a:solidFill>
+            <a:tailEnd type="triangle"/>
+          </a:ln>
+        </p:spPr>
+        <p:style>
+          <a:lnRef idx="1">
+            <a:schemeClr val="accent1"/>
+          </a:lnRef>
+          <a:fillRef idx="0">
+            <a:schemeClr val="accent1"/>
+          </a:fillRef>
+          <a:effectRef idx="0">
+            <a:schemeClr val="accent1"/>
+          </a:effectRef>
+          <a:fontRef idx="minor">
+            <a:schemeClr val="tx1"/>
+          </a:fontRef>
+        </p:style>
+      </p:cxnSp>
+      <p:sp>
+        <p:nvSpPr>
+          <p:cNvPr id="26" name="TextBox 25">
+            <a:extLst>
+              <a:ext uri="{FF2B5EF4-FFF2-40B4-BE49-F238E27FC236}">
+                <a16:creationId xmlns:a16="http://schemas.microsoft.com/office/drawing/2014/main" id="{7BF4133E-B1FC-4569-A507-38F72BC7077A}"/>
+              </a:ext>
+            </a:extLst>
+          </p:cNvPr>
+          <p:cNvSpPr txBox="1"/>
+          <p:nvPr/>
+        </p:nvSpPr>
+        <p:spPr>
+          <a:xfrm>
+            <a:off x="5209763" y="3909369"/>
+            <a:ext cx="377988" cy="157244"/>
+          </a:xfrm>
+          <a:prstGeom prst="rect">
+            <a:avLst/>
+          </a:prstGeom>
+        </p:spPr>
+        <p:txBody>
+          <a:bodyPr vert="horz" wrap="none" lIns="0" tIns="0" rIns="0" bIns="0" rtlCol="0" anchor="t">
+            <a:noAutofit/>
+          </a:bodyPr>
+          <a:lstStyle/>
+          <a:p>
+            <a:r>
+              <a:rPr lang="en-US" sz="1000" b="1"/>
+              <a:t>10 kΩ</a:t>
+            </a:r>
+            <a:endParaRPr lang="en-US" sz="1000" b="1" dirty="0">
+              <a:latin typeface="Gill Sans MT" panose="020B0502020104020203" pitchFamily="34" charset="0"/>
+            </a:endParaRPr>
+          </a:p>
+        </p:txBody>
+      </p:sp>
+      <p:sp>
+        <p:nvSpPr>
+          <p:cNvPr id="55" name="TextBox 54">
+            <a:extLst>
+              <a:ext uri="{FF2B5EF4-FFF2-40B4-BE49-F238E27FC236}">
+                <a16:creationId xmlns:a16="http://schemas.microsoft.com/office/drawing/2014/main" id="{5987722B-9D64-4CC9-8CBC-D11195EE4AD5}"/>
+              </a:ext>
+            </a:extLst>
+          </p:cNvPr>
+          <p:cNvSpPr txBox="1"/>
+          <p:nvPr/>
+        </p:nvSpPr>
+        <p:spPr>
+          <a:xfrm>
+            <a:off x="5153667" y="3730001"/>
+            <a:ext cx="377988" cy="157244"/>
+          </a:xfrm>
+          <a:prstGeom prst="rect">
+            <a:avLst/>
+          </a:prstGeom>
+        </p:spPr>
+        <p:txBody>
+          <a:bodyPr vert="horz" wrap="none" lIns="0" tIns="0" rIns="0" bIns="0" rtlCol="0" anchor="t">
+            <a:noAutofit/>
+          </a:bodyPr>
+          <a:lstStyle/>
+          <a:p>
+            <a:r>
+              <a:rPr lang="en-US" sz="1000" b="1">
+                <a:solidFill>
+                  <a:schemeClr val="accent1"/>
+                </a:solidFill>
+              </a:rPr>
+              <a:t>Vcc</a:t>
+            </a:r>
+            <a:endParaRPr lang="en-US" sz="1000" b="1" dirty="0">
+              <a:solidFill>
+                <a:schemeClr val="accent1"/>
+              </a:solidFill>
+              <a:latin typeface="Gill Sans MT" panose="020B0502020104020203" pitchFamily="34" charset="0"/>
+            </a:endParaRPr>
+          </a:p>
+        </p:txBody>
+      </p:sp>
+      <p:sp>
+        <p:nvSpPr>
+          <p:cNvPr id="27" name="Oval 26">
+            <a:extLst>
+              <a:ext uri="{FF2B5EF4-FFF2-40B4-BE49-F238E27FC236}">
+                <a16:creationId xmlns:a16="http://schemas.microsoft.com/office/drawing/2014/main" id="{6B6DD5DD-0AF4-4B7E-B37C-7E0EF76A63C0}"/>
+              </a:ext>
+            </a:extLst>
+          </p:cNvPr>
+          <p:cNvSpPr/>
+          <p:nvPr/>
+        </p:nvSpPr>
+        <p:spPr>
+          <a:xfrm>
+            <a:off x="5058292" y="4125090"/>
+            <a:ext cx="78367" cy="68873"/>
+          </a:xfrm>
+          <a:prstGeom prst="ellipse">
+            <a:avLst/>
+          </a:prstGeom>
+          <a:solidFill>
+            <a:schemeClr val="accent1"/>
+          </a:solidFill>
+          <a:ln>
             <a:solidFill>
               <a:schemeClr val="accent1"/>
             </a:solidFill>
@@ -6823,69 +7100,14 @@
 
 <file path=customXml/item1.xml><?xml version="1.0" encoding="utf-8"?>
 <?mso-contentType ?>
-<spe:Receivers xmlns:spe="http://schemas.microsoft.com/sharepoint/events">
-  <Receiver>
-    <Name>Document ID Generator</Name>
-    <Synchronization>Synchronous</Synchronization>
-    <Type>10001</Type>
-    <SequenceNumber>1000</SequenceNumber>
-    <Assembly>Microsoft.Office.DocumentManagement, Version=14.0.0.0, Culture=neutral, PublicKeyToken=71e9bce111e9429c</Assembly>
-    <Class>Microsoft.Office.DocumentManagement.Internal.DocIdHandler</Class>
-    <Data/>
-    <Filter/>
-  </Receiver>
-  <Receiver>
-    <Name>Document ID Generator</Name>
-    <Synchronization>Synchronous</Synchronization>
-    <Type>10002</Type>
-    <SequenceNumber>1001</SequenceNumber>
-    <Assembly>Microsoft.Office.DocumentManagement, Version=14.0.0.0, Culture=neutral, PublicKeyToken=71e9bce111e9429c</Assembly>
-    <Class>Microsoft.Office.DocumentManagement.Internal.DocIdHandler</Class>
-    <Data/>
-    <Filter/>
-  </Receiver>
-  <Receiver>
-    <Name>Document ID Generator</Name>
-    <Synchronization>Synchronous</Synchronization>
-    <Type>10004</Type>
-    <SequenceNumber>1002</SequenceNumber>
-    <Assembly>Microsoft.Office.DocumentManagement, Version=14.0.0.0, Culture=neutral, PublicKeyToken=71e9bce111e9429c</Assembly>
-    <Class>Microsoft.Office.DocumentManagement.Internal.DocIdHandler</Class>
-    <Data/>
-    <Filter/>
-  </Receiver>
-  <Receiver>
-    <Name>Document ID Generator</Name>
-    <Synchronization>Synchronous</Synchronization>
-    <Type>10006</Type>
-    <SequenceNumber>1003</SequenceNumber>
-    <Assembly>Microsoft.Office.DocumentManagement, Version=14.0.0.0, Culture=neutral, PublicKeyToken=71e9bce111e9429c</Assembly>
-    <Class>Microsoft.Office.DocumentManagement.Internal.DocIdHandler</Class>
-    <Data/>
-    <Filter/>
-  </Receiver>
-</spe:Receivers>
+<FormTemplates xmlns="http://schemas.microsoft.com/sharepoint/v3/contenttype/forms">
+  <Display>DocumentLibraryForm</Display>
+  <Edit>DocumentLibraryForm</Edit>
+  <New>DocumentLibraryForm</New>
+</FormTemplates>
 </file>
 
 <file path=customXml/item2.xml><?xml version="1.0" encoding="utf-8"?>
-<p:properties xmlns:p="http://schemas.microsoft.com/office/2006/metadata/properties" xmlns:xsi="http://www.w3.org/2001/XMLSchema-instance">
-  <documentManagement>
-    <AlternateThumbnailUrl xmlns="http://schemas.microsoft.com/sharepoint/v3">
-      <Url xsi:nil="true"/>
-      <Description xsi:nil="true"/>
-    </AlternateThumbnailUrl>
-    <ImageCreateDate xmlns="http://schemas.microsoft.com/sharepoint/v3" xsi:nil="true"/>
-    <Description xmlns="http://schemas.microsoft.com/sharepoint/v3" xsi:nil="true"/>
-    <_dlc_DocId xmlns="f2ad5090-61a8-4b8c-ab70-68f4ff4d1933">ARM-ECM-0151353</_dlc_DocId>
-    <_dlc_DocIdUrl xmlns="f2ad5090-61a8-4b8c-ab70-68f4ff4d1933">
-      <Url>http://teamsites.arm.com/sites/marketing/branding/_layouts/DocIdRedir.aspx?ID=ARM-ECM-0151353</Url>
-      <Description>ARM-ECM-0151353</Description>
-    </_dlc_DocIdUrl>
-  </documentManagement>
-</p:properties>
-</file>
-
-<file path=customXml/item3.xml><?xml version="1.0" encoding="utf-8"?>
 <ct:contentTypeSchema xmlns:ct="http://schemas.microsoft.com/office/2006/metadata/contentType" xmlns:ma="http://schemas.microsoft.com/office/2006/metadata/properties/metaAttributes" ct:_="" ma:_="" ma:contentTypeName="Picture" ma:contentTypeID="0x010102005A5C1BE65173D647975D08D04557E024" ma:contentTypeVersion="3" ma:contentTypeDescription="Upload an image or a photograph." ma:contentTypeScope="" ma:versionID="4e02033e9a8407b55ee482baa8e8773d">
   <xsd:schema xmlns:xsd="http://www.w3.org/2001/XMLSchema" xmlns:xs="http://www.w3.org/2001/XMLSchema" xmlns:p="http://schemas.microsoft.com/office/2006/metadata/properties" xmlns:ns1="http://schemas.microsoft.com/sharepoint/v3" xmlns:ns2="f2ad5090-61a8-4b8c-ab70-68f4ff4d1933" targetNamespace="http://schemas.microsoft.com/office/2006/metadata/properties" ma:root="true" ma:fieldsID="56baf7bb33d679821ced92383ddba583" ns1:_="" ns2:_="">
     <xsd:import namespace="http://schemas.microsoft.com/sharepoint/v3"/>
@@ -7086,41 +7308,79 @@
 </ct:contentTypeSchema>
 </file>
 
+<file path=customXml/item3.xml><?xml version="1.0" encoding="utf-8"?>
+<p:properties xmlns:p="http://schemas.microsoft.com/office/2006/metadata/properties" xmlns:xsi="http://www.w3.org/2001/XMLSchema-instance">
+  <documentManagement>
+    <AlternateThumbnailUrl xmlns="http://schemas.microsoft.com/sharepoint/v3">
+      <Url xsi:nil="true"/>
+      <Description xsi:nil="true"/>
+    </AlternateThumbnailUrl>
+    <ImageCreateDate xmlns="http://schemas.microsoft.com/sharepoint/v3" xsi:nil="true"/>
+    <Description xmlns="http://schemas.microsoft.com/sharepoint/v3" xsi:nil="true"/>
+    <_dlc_DocId xmlns="f2ad5090-61a8-4b8c-ab70-68f4ff4d1933">ARM-ECM-0151353</_dlc_DocId>
+    <_dlc_DocIdUrl xmlns="f2ad5090-61a8-4b8c-ab70-68f4ff4d1933">
+      <Url>http://teamsites.arm.com/sites/marketing/branding/_layouts/DocIdRedir.aspx?ID=ARM-ECM-0151353</Url>
+      <Description>ARM-ECM-0151353</Description>
+    </_dlc_DocIdUrl>
+  </documentManagement>
+</p:properties>
+</file>
+
 <file path=customXml/item4.xml><?xml version="1.0" encoding="utf-8"?>
 <?mso-contentType ?>
-<FormTemplates xmlns="http://schemas.microsoft.com/sharepoint/v3/contenttype/forms">
-  <Display>DocumentLibraryForm</Display>
-  <Edit>DocumentLibraryForm</Edit>
-  <New>DocumentLibraryForm</New>
-</FormTemplates>
+<spe:Receivers xmlns:spe="http://schemas.microsoft.com/sharepoint/events">
+  <Receiver>
+    <Name>Document ID Generator</Name>
+    <Synchronization>Synchronous</Synchronization>
+    <Type>10001</Type>
+    <SequenceNumber>1000</SequenceNumber>
+    <Assembly>Microsoft.Office.DocumentManagement, Version=14.0.0.0, Culture=neutral, PublicKeyToken=71e9bce111e9429c</Assembly>
+    <Class>Microsoft.Office.DocumentManagement.Internal.DocIdHandler</Class>
+    <Data/>
+    <Filter/>
+  </Receiver>
+  <Receiver>
+    <Name>Document ID Generator</Name>
+    <Synchronization>Synchronous</Synchronization>
+    <Type>10002</Type>
+    <SequenceNumber>1001</SequenceNumber>
+    <Assembly>Microsoft.Office.DocumentManagement, Version=14.0.0.0, Culture=neutral, PublicKeyToken=71e9bce111e9429c</Assembly>
+    <Class>Microsoft.Office.DocumentManagement.Internal.DocIdHandler</Class>
+    <Data/>
+    <Filter/>
+  </Receiver>
+  <Receiver>
+    <Name>Document ID Generator</Name>
+    <Synchronization>Synchronous</Synchronization>
+    <Type>10004</Type>
+    <SequenceNumber>1002</SequenceNumber>
+    <Assembly>Microsoft.Office.DocumentManagement, Version=14.0.0.0, Culture=neutral, PublicKeyToken=71e9bce111e9429c</Assembly>
+    <Class>Microsoft.Office.DocumentManagement.Internal.DocIdHandler</Class>
+    <Data/>
+    <Filter/>
+  </Receiver>
+  <Receiver>
+    <Name>Document ID Generator</Name>
+    <Synchronization>Synchronous</Synchronization>
+    <Type>10006</Type>
+    <SequenceNumber>1003</SequenceNumber>
+    <Assembly>Microsoft.Office.DocumentManagement, Version=14.0.0.0, Culture=neutral, PublicKeyToken=71e9bce111e9429c</Assembly>
+    <Class>Microsoft.Office.DocumentManagement.Internal.DocIdHandler</Class>
+    <Data/>
+    <Filter/>
+  </Receiver>
+</spe:Receivers>
 </file>
 
 <file path=customXml/itemProps1.xml><?xml version="1.0" encoding="utf-8"?>
-<ds:datastoreItem xmlns:ds="http://schemas.openxmlformats.org/officeDocument/2006/customXml" ds:itemID="{C8CB23D7-89E5-42FF-A5EB-008A06AB37C7}">
+<ds:datastoreItem xmlns:ds="http://schemas.openxmlformats.org/officeDocument/2006/customXml" ds:itemID="{9C777C69-0744-4BF3-8514-FB149EBD2248}">
   <ds:schemaRefs>
-    <ds:schemaRef ds:uri="http://schemas.microsoft.com/sharepoint/events"/>
+    <ds:schemaRef ds:uri="http://schemas.microsoft.com/sharepoint/v3/contenttype/forms"/>
   </ds:schemaRefs>
 </ds:datastoreItem>
 </file>
 
 <file path=customXml/itemProps2.xml><?xml version="1.0" encoding="utf-8"?>
-<ds:datastoreItem xmlns:ds="http://schemas.openxmlformats.org/officeDocument/2006/customXml" ds:itemID="{AE6E82D6-7FB8-4D99-A7B6-3C5BB1D894B9}">
-  <ds:schemaRefs>
-    <ds:schemaRef ds:uri="http://schemas.microsoft.com/office/2006/metadata/properties"/>
-    <ds:schemaRef ds:uri="http://schemas.openxmlformats.org/package/2006/metadata/core-properties"/>
-    <ds:schemaRef ds:uri="http://schemas.microsoft.com/office/2006/documentManagement/types"/>
-    <ds:schemaRef ds:uri="http://purl.org/dc/dcmitype/"/>
-    <ds:schemaRef ds:uri="http://purl.org/dc/elements/1.1/"/>
-    <ds:schemaRef ds:uri="http://schemas.microsoft.com/office/infopath/2007/PartnerControls"/>
-    <ds:schemaRef ds:uri="f2ad5090-61a8-4b8c-ab70-68f4ff4d1933"/>
-    <ds:schemaRef ds:uri="http://purl.org/dc/terms/"/>
-    <ds:schemaRef ds:uri="http://schemas.microsoft.com/sharepoint/v3"/>
-    <ds:schemaRef ds:uri="http://www.w3.org/XML/1998/namespace"/>
-  </ds:schemaRefs>
-</ds:datastoreItem>
-</file>
-
-<file path=customXml/itemProps3.xml><?xml version="1.0" encoding="utf-8"?>
 <ds:datastoreItem xmlns:ds="http://schemas.openxmlformats.org/officeDocument/2006/customXml" ds:itemID="{E2FEA05E-38D0-44EA-8B8D-2375FC6AAF09}">
   <ds:schemaRefs>
     <ds:schemaRef ds:uri="http://schemas.microsoft.com/office/2006/metadata/contentType"/>
@@ -7139,10 +7399,27 @@
 </ds:datastoreItem>
 </file>
 
+<file path=customXml/itemProps3.xml><?xml version="1.0" encoding="utf-8"?>
+<ds:datastoreItem xmlns:ds="http://schemas.openxmlformats.org/officeDocument/2006/customXml" ds:itemID="{AE6E82D6-7FB8-4D99-A7B6-3C5BB1D894B9}">
+  <ds:schemaRefs>
+    <ds:schemaRef ds:uri="http://schemas.microsoft.com/office/2006/metadata/properties"/>
+    <ds:schemaRef ds:uri="http://schemas.openxmlformats.org/package/2006/metadata/core-properties"/>
+    <ds:schemaRef ds:uri="http://schemas.microsoft.com/office/2006/documentManagement/types"/>
+    <ds:schemaRef ds:uri="http://purl.org/dc/dcmitype/"/>
+    <ds:schemaRef ds:uri="http://purl.org/dc/elements/1.1/"/>
+    <ds:schemaRef ds:uri="http://schemas.microsoft.com/office/infopath/2007/PartnerControls"/>
+    <ds:schemaRef ds:uri="f2ad5090-61a8-4b8c-ab70-68f4ff4d1933"/>
+    <ds:schemaRef ds:uri="http://purl.org/dc/terms/"/>
+    <ds:schemaRef ds:uri="http://schemas.microsoft.com/sharepoint/v3"/>
+    <ds:schemaRef ds:uri="http://www.w3.org/XML/1998/namespace"/>
+  </ds:schemaRefs>
+</ds:datastoreItem>
+</file>
+
 <file path=customXml/itemProps4.xml><?xml version="1.0" encoding="utf-8"?>
-<ds:datastoreItem xmlns:ds="http://schemas.openxmlformats.org/officeDocument/2006/customXml" ds:itemID="{9C777C69-0744-4BF3-8514-FB149EBD2248}">
+<ds:datastoreItem xmlns:ds="http://schemas.openxmlformats.org/officeDocument/2006/customXml" ds:itemID="{C8CB23D7-89E5-42FF-A5EB-008A06AB37C7}">
   <ds:schemaRefs>
-    <ds:schemaRef ds:uri="http://schemas.microsoft.com/sharepoint/v3/contenttype/forms"/>
+    <ds:schemaRef ds:uri="http://schemas.microsoft.com/sharepoint/events"/>
   </ds:schemaRefs>
 </ds:datastoreItem>
 </file>
</xml_diff>